<commit_message>
run colab local for plots
</commit_message>
<xml_diff>
--- a/project2/miniproject2_guide.pptx
+++ b/project2/miniproject2_guide.pptx
@@ -28,14 +28,14 @@
     <p:sldId id="271" r:id="rId16"/>
     <p:sldId id="273" r:id="rId17"/>
   </p:sldIdLst>
-  <p:sldSz cx="9144000" cy="6858000" type="screen4x3"/>
+  <p:sldSz cx="18288000" cy="18288000"/>
   <p:notesSz cx="6858000" cy="9144000"/>
   <p:defaultTextStyle>
     <a:defPPr>
       <a:defRPr lang="en-US"/>
     </a:defPPr>
-    <a:lvl1pPr marL="0" algn="l" defTabSz="457200" rtl="0" eaLnBrk="1" latinLnBrk="0" hangingPunct="1">
-      <a:defRPr sz="1800" kern="1200">
+    <a:lvl1pPr marL="0" algn="l" defTabSz="1044995" rtl="0" eaLnBrk="1" latinLnBrk="0" hangingPunct="1">
+      <a:defRPr sz="4114" kern="1200">
         <a:solidFill>
           <a:schemeClr val="tx1"/>
         </a:solidFill>
@@ -44,8 +44,8 @@
         <a:cs typeface="+mn-cs"/>
       </a:defRPr>
     </a:lvl1pPr>
-    <a:lvl2pPr marL="457200" algn="l" defTabSz="457200" rtl="0" eaLnBrk="1" latinLnBrk="0" hangingPunct="1">
-      <a:defRPr sz="1800" kern="1200">
+    <a:lvl2pPr marL="1044995" algn="l" defTabSz="1044995" rtl="0" eaLnBrk="1" latinLnBrk="0" hangingPunct="1">
+      <a:defRPr sz="4114" kern="1200">
         <a:solidFill>
           <a:schemeClr val="tx1"/>
         </a:solidFill>
@@ -54,8 +54,8 @@
         <a:cs typeface="+mn-cs"/>
       </a:defRPr>
     </a:lvl2pPr>
-    <a:lvl3pPr marL="914400" algn="l" defTabSz="457200" rtl="0" eaLnBrk="1" latinLnBrk="0" hangingPunct="1">
-      <a:defRPr sz="1800" kern="1200">
+    <a:lvl3pPr marL="2089989" algn="l" defTabSz="1044995" rtl="0" eaLnBrk="1" latinLnBrk="0" hangingPunct="1">
+      <a:defRPr sz="4114" kern="1200">
         <a:solidFill>
           <a:schemeClr val="tx1"/>
         </a:solidFill>
@@ -64,8 +64,8 @@
         <a:cs typeface="+mn-cs"/>
       </a:defRPr>
     </a:lvl3pPr>
-    <a:lvl4pPr marL="1371600" algn="l" defTabSz="457200" rtl="0" eaLnBrk="1" latinLnBrk="0" hangingPunct="1">
-      <a:defRPr sz="1800" kern="1200">
+    <a:lvl4pPr marL="3134984" algn="l" defTabSz="1044995" rtl="0" eaLnBrk="1" latinLnBrk="0" hangingPunct="1">
+      <a:defRPr sz="4114" kern="1200">
         <a:solidFill>
           <a:schemeClr val="tx1"/>
         </a:solidFill>
@@ -74,8 +74,8 @@
         <a:cs typeface="+mn-cs"/>
       </a:defRPr>
     </a:lvl4pPr>
-    <a:lvl5pPr marL="1828800" algn="l" defTabSz="457200" rtl="0" eaLnBrk="1" latinLnBrk="0" hangingPunct="1">
-      <a:defRPr sz="1800" kern="1200">
+    <a:lvl5pPr marL="4179978" algn="l" defTabSz="1044995" rtl="0" eaLnBrk="1" latinLnBrk="0" hangingPunct="1">
+      <a:defRPr sz="4114" kern="1200">
         <a:solidFill>
           <a:schemeClr val="tx1"/>
         </a:solidFill>
@@ -84,8 +84,8 @@
         <a:cs typeface="+mn-cs"/>
       </a:defRPr>
     </a:lvl5pPr>
-    <a:lvl6pPr marL="2286000" algn="l" defTabSz="457200" rtl="0" eaLnBrk="1" latinLnBrk="0" hangingPunct="1">
-      <a:defRPr sz="1800" kern="1200">
+    <a:lvl6pPr marL="5224973" algn="l" defTabSz="1044995" rtl="0" eaLnBrk="1" latinLnBrk="0" hangingPunct="1">
+      <a:defRPr sz="4114" kern="1200">
         <a:solidFill>
           <a:schemeClr val="tx1"/>
         </a:solidFill>
@@ -94,8 +94,8 @@
         <a:cs typeface="+mn-cs"/>
       </a:defRPr>
     </a:lvl6pPr>
-    <a:lvl7pPr marL="2743200" algn="l" defTabSz="457200" rtl="0" eaLnBrk="1" latinLnBrk="0" hangingPunct="1">
-      <a:defRPr sz="1800" kern="1200">
+    <a:lvl7pPr marL="6269968" algn="l" defTabSz="1044995" rtl="0" eaLnBrk="1" latinLnBrk="0" hangingPunct="1">
+      <a:defRPr sz="4114" kern="1200">
         <a:solidFill>
           <a:schemeClr val="tx1"/>
         </a:solidFill>
@@ -104,8 +104,8 @@
         <a:cs typeface="+mn-cs"/>
       </a:defRPr>
     </a:lvl7pPr>
-    <a:lvl8pPr marL="3200400" algn="l" defTabSz="457200" rtl="0" eaLnBrk="1" latinLnBrk="0" hangingPunct="1">
-      <a:defRPr sz="1800" kern="1200">
+    <a:lvl8pPr marL="7314962" algn="l" defTabSz="1044995" rtl="0" eaLnBrk="1" latinLnBrk="0" hangingPunct="1">
+      <a:defRPr sz="4114" kern="1200">
         <a:solidFill>
           <a:schemeClr val="tx1"/>
         </a:solidFill>
@@ -114,8 +114,8 @@
         <a:cs typeface="+mn-cs"/>
       </a:defRPr>
     </a:lvl8pPr>
-    <a:lvl9pPr marL="3657600" algn="l" defTabSz="457200" rtl="0" eaLnBrk="1" latinLnBrk="0" hangingPunct="1">
-      <a:defRPr sz="1800" kern="1200">
+    <a:lvl9pPr marL="8359957" algn="l" defTabSz="1044995" rtl="0" eaLnBrk="1" latinLnBrk="0" hangingPunct="1">
+      <a:defRPr sz="4114" kern="1200">
         <a:solidFill>
           <a:schemeClr val="tx1"/>
         </a:solidFill>
@@ -128,12 +128,12 @@
   <p:extLst>
     <p:ext uri="{EFAFB233-063F-42B5-8137-9DF3F51BA10A}">
       <p15:sldGuideLst xmlns:p15="http://schemas.microsoft.com/office/powerpoint/2012/main">
-        <p15:guide id="1" orient="horz" pos="2160">
+        <p15:guide id="1" orient="horz" pos="5760" userDrawn="1">
           <p15:clr>
             <a:srgbClr val="A4A3A4"/>
           </p15:clr>
         </p15:guide>
-        <p15:guide id="2" pos="2880">
+        <p15:guide id="2" pos="5760" userDrawn="1">
           <p15:clr>
             <a:srgbClr val="A4A3A4"/>
           </p15:clr>
@@ -226,7 +226,7 @@
           <a:p>
             <a:fld id="{0918F070-10D7-B04C-89FC-5B4AD48ABD2F}" type="datetimeFigureOut">
               <a:rPr lang="en-US" smtClean="0"/>
-              <a:t>2/14/2018</a:t>
+              <a:t>2/25/21</a:t>
             </a:fld>
             <a:endParaRPr lang="en-US"/>
           </a:p>
@@ -392,7 +392,7 @@
           <a:p>
             <a:fld id="{BE48478B-6CB6-1648-AD11-4BCA276D364A}" type="datetimeFigureOut">
               <a:rPr lang="en-US" smtClean="0"/>
-              <a:t>2/14/2018</a:t>
+              <a:t>2/25/21</a:t>
             </a:fld>
             <a:endParaRPr lang="en-US"/>
           </a:p>
@@ -410,8 +410,8 @@
         </p:nvSpPr>
         <p:spPr>
           <a:xfrm>
-            <a:off x="1143000" y="685800"/>
-            <a:ext cx="4572000" cy="3429000"/>
+            <a:off x="1714500" y="685800"/>
+            <a:ext cx="3429000" cy="3429000"/>
           </a:xfrm>
           <a:prstGeom prst="rect">
             <a:avLst/>
@@ -566,8 +566,8 @@
   <p:clrMap bg1="lt1" tx1="dk1" bg2="lt2" tx2="dk2" accent1="accent1" accent2="accent2" accent3="accent3" accent4="accent4" accent5="accent5" accent6="accent6" hlink="hlink" folHlink="folHlink"/>
   <p:hf hdr="0" ftr="0" dt="0"/>
   <p:notesStyle>
-    <a:lvl1pPr marL="0" algn="l" defTabSz="457200" rtl="0" eaLnBrk="1" latinLnBrk="0" hangingPunct="1">
-      <a:defRPr sz="1200" kern="1200">
+    <a:lvl1pPr marL="0" algn="l" defTabSz="1044995" rtl="0" eaLnBrk="1" latinLnBrk="0" hangingPunct="1">
+      <a:defRPr sz="2743" kern="1200">
         <a:solidFill>
           <a:schemeClr val="tx1"/>
         </a:solidFill>
@@ -576,8 +576,8 @@
         <a:cs typeface="+mn-cs"/>
       </a:defRPr>
     </a:lvl1pPr>
-    <a:lvl2pPr marL="457200" algn="l" defTabSz="457200" rtl="0" eaLnBrk="1" latinLnBrk="0" hangingPunct="1">
-      <a:defRPr sz="1200" kern="1200">
+    <a:lvl2pPr marL="1044995" algn="l" defTabSz="1044995" rtl="0" eaLnBrk="1" latinLnBrk="0" hangingPunct="1">
+      <a:defRPr sz="2743" kern="1200">
         <a:solidFill>
           <a:schemeClr val="tx1"/>
         </a:solidFill>
@@ -586,8 +586,8 @@
         <a:cs typeface="+mn-cs"/>
       </a:defRPr>
     </a:lvl2pPr>
-    <a:lvl3pPr marL="914400" algn="l" defTabSz="457200" rtl="0" eaLnBrk="1" latinLnBrk="0" hangingPunct="1">
-      <a:defRPr sz="1200" kern="1200">
+    <a:lvl3pPr marL="2089989" algn="l" defTabSz="1044995" rtl="0" eaLnBrk="1" latinLnBrk="0" hangingPunct="1">
+      <a:defRPr sz="2743" kern="1200">
         <a:solidFill>
           <a:schemeClr val="tx1"/>
         </a:solidFill>
@@ -596,8 +596,8 @@
         <a:cs typeface="+mn-cs"/>
       </a:defRPr>
     </a:lvl3pPr>
-    <a:lvl4pPr marL="1371600" algn="l" defTabSz="457200" rtl="0" eaLnBrk="1" latinLnBrk="0" hangingPunct="1">
-      <a:defRPr sz="1200" kern="1200">
+    <a:lvl4pPr marL="3134984" algn="l" defTabSz="1044995" rtl="0" eaLnBrk="1" latinLnBrk="0" hangingPunct="1">
+      <a:defRPr sz="2743" kern="1200">
         <a:solidFill>
           <a:schemeClr val="tx1"/>
         </a:solidFill>
@@ -606,8 +606,8 @@
         <a:cs typeface="+mn-cs"/>
       </a:defRPr>
     </a:lvl4pPr>
-    <a:lvl5pPr marL="1828800" algn="l" defTabSz="457200" rtl="0" eaLnBrk="1" latinLnBrk="0" hangingPunct="1">
-      <a:defRPr sz="1200" kern="1200">
+    <a:lvl5pPr marL="4179978" algn="l" defTabSz="1044995" rtl="0" eaLnBrk="1" latinLnBrk="0" hangingPunct="1">
+      <a:defRPr sz="2743" kern="1200">
         <a:solidFill>
           <a:schemeClr val="tx1"/>
         </a:solidFill>
@@ -616,8 +616,8 @@
         <a:cs typeface="+mn-cs"/>
       </a:defRPr>
     </a:lvl5pPr>
-    <a:lvl6pPr marL="2286000" algn="l" defTabSz="457200" rtl="0" eaLnBrk="1" latinLnBrk="0" hangingPunct="1">
-      <a:defRPr sz="1200" kern="1200">
+    <a:lvl6pPr marL="5224973" algn="l" defTabSz="1044995" rtl="0" eaLnBrk="1" latinLnBrk="0" hangingPunct="1">
+      <a:defRPr sz="2743" kern="1200">
         <a:solidFill>
           <a:schemeClr val="tx1"/>
         </a:solidFill>
@@ -626,8 +626,8 @@
         <a:cs typeface="+mn-cs"/>
       </a:defRPr>
     </a:lvl6pPr>
-    <a:lvl7pPr marL="2743200" algn="l" defTabSz="457200" rtl="0" eaLnBrk="1" latinLnBrk="0" hangingPunct="1">
-      <a:defRPr sz="1200" kern="1200">
+    <a:lvl7pPr marL="6269968" algn="l" defTabSz="1044995" rtl="0" eaLnBrk="1" latinLnBrk="0" hangingPunct="1">
+      <a:defRPr sz="2743" kern="1200">
         <a:solidFill>
           <a:schemeClr val="tx1"/>
         </a:solidFill>
@@ -636,8 +636,8 @@
         <a:cs typeface="+mn-cs"/>
       </a:defRPr>
     </a:lvl7pPr>
-    <a:lvl8pPr marL="3200400" algn="l" defTabSz="457200" rtl="0" eaLnBrk="1" latinLnBrk="0" hangingPunct="1">
-      <a:defRPr sz="1200" kern="1200">
+    <a:lvl8pPr marL="7314962" algn="l" defTabSz="1044995" rtl="0" eaLnBrk="1" latinLnBrk="0" hangingPunct="1">
+      <a:defRPr sz="2743" kern="1200">
         <a:solidFill>
           <a:schemeClr val="tx1"/>
         </a:solidFill>
@@ -646,8 +646,8 @@
         <a:cs typeface="+mn-cs"/>
       </a:defRPr>
     </a:lvl8pPr>
-    <a:lvl9pPr marL="3657600" algn="l" defTabSz="457200" rtl="0" eaLnBrk="1" latinLnBrk="0" hangingPunct="1">
-      <a:defRPr sz="1200" kern="1200">
+    <a:lvl9pPr marL="8359957" algn="l" defTabSz="1044995" rtl="0" eaLnBrk="1" latinLnBrk="0" hangingPunct="1">
+      <a:defRPr sz="2743" kern="1200">
         <a:solidFill>
           <a:schemeClr val="tx1"/>
         </a:solidFill>
@@ -689,8 +689,8 @@
         </p:nvSpPr>
         <p:spPr>
           <a:xfrm>
-            <a:off x="685800" y="2130425"/>
-            <a:ext cx="7772400" cy="1470025"/>
+            <a:off x="1371600" y="5681136"/>
+            <a:ext cx="15544800" cy="3920067"/>
           </a:xfrm>
         </p:spPr>
         <p:txBody>
@@ -716,8 +716,8 @@
         </p:nvSpPr>
         <p:spPr>
           <a:xfrm>
-            <a:off x="1371600" y="3886200"/>
-            <a:ext cx="6400800" cy="1752600"/>
+            <a:off x="2743200" y="10363200"/>
+            <a:ext cx="12801600" cy="4673600"/>
           </a:xfrm>
         </p:spPr>
         <p:txBody>
@@ -733,7 +733,7 @@
                 </a:solidFill>
               </a:defRPr>
             </a:lvl1pPr>
-            <a:lvl2pPr marL="457200" indent="0" algn="ctr">
+            <a:lvl2pPr marL="914418" indent="0" algn="ctr">
               <a:buNone/>
               <a:defRPr>
                 <a:solidFill>
@@ -743,7 +743,7 @@
                 </a:solidFill>
               </a:defRPr>
             </a:lvl2pPr>
-            <a:lvl3pPr marL="914400" indent="0" algn="ctr">
+            <a:lvl3pPr marL="1828837" indent="0" algn="ctr">
               <a:buNone/>
               <a:defRPr>
                 <a:solidFill>
@@ -753,7 +753,7 @@
                 </a:solidFill>
               </a:defRPr>
             </a:lvl3pPr>
-            <a:lvl4pPr marL="1371600" indent="0" algn="ctr">
+            <a:lvl4pPr marL="2743255" indent="0" algn="ctr">
               <a:buNone/>
               <a:defRPr>
                 <a:solidFill>
@@ -763,7 +763,7 @@
                 </a:solidFill>
               </a:defRPr>
             </a:lvl4pPr>
-            <a:lvl5pPr marL="1828800" indent="0" algn="ctr">
+            <a:lvl5pPr marL="3657673" indent="0" algn="ctr">
               <a:buNone/>
               <a:defRPr>
                 <a:solidFill>
@@ -773,7 +773,7 @@
                 </a:solidFill>
               </a:defRPr>
             </a:lvl5pPr>
-            <a:lvl6pPr marL="2286000" indent="0" algn="ctr">
+            <a:lvl6pPr marL="4572091" indent="0" algn="ctr">
               <a:buNone/>
               <a:defRPr>
                 <a:solidFill>
@@ -783,7 +783,7 @@
                 </a:solidFill>
               </a:defRPr>
             </a:lvl6pPr>
-            <a:lvl7pPr marL="2743200" indent="0" algn="ctr">
+            <a:lvl7pPr marL="5486510" indent="0" algn="ctr">
               <a:buNone/>
               <a:defRPr>
                 <a:solidFill>
@@ -793,7 +793,7 @@
                 </a:solidFill>
               </a:defRPr>
             </a:lvl7pPr>
-            <a:lvl8pPr marL="3200400" indent="0" algn="ctr">
+            <a:lvl8pPr marL="6400928" indent="0" algn="ctr">
               <a:buNone/>
               <a:defRPr>
                 <a:solidFill>
@@ -803,7 +803,7 @@
                 </a:solidFill>
               </a:defRPr>
             </a:lvl8pPr>
-            <a:lvl9pPr marL="3657600" indent="0" algn="ctr">
+            <a:lvl9pPr marL="7315346" indent="0" algn="ctr">
               <a:buNone/>
               <a:defRPr>
                 <a:solidFill>
@@ -834,8 +834,8 @@
         </p:nvSpPr>
         <p:spPr>
           <a:xfrm>
-            <a:off x="457200" y="6356350"/>
-            <a:ext cx="2133600" cy="365125"/>
+            <a:off x="914400" y="16950269"/>
+            <a:ext cx="4267200" cy="973667"/>
           </a:xfrm>
           <a:prstGeom prst="rect">
             <a:avLst/>
@@ -869,14 +869,13 @@
               <a:t>Step-By-Step Instructions for </a:t>
             </a:r>
             <a:r>
-              <a:rPr lang="en-US" dirty="0" err="1" smtClean="0"/>
+              <a:rPr lang="en-US" dirty="0" err="1"/>
               <a:t>Miniproject</a:t>
             </a:r>
             <a:r>
-              <a:rPr lang="en-US" dirty="0" smtClean="0"/>
+              <a:rPr lang="en-US" dirty="0"/>
               <a:t> 2</a:t>
             </a:r>
-            <a:endParaRPr lang="en-US" dirty="0"/>
           </a:p>
         </p:txBody>
       </p:sp>
@@ -1018,8 +1017,8 @@
         </p:nvSpPr>
         <p:spPr>
           <a:xfrm>
-            <a:off x="457200" y="6356350"/>
-            <a:ext cx="2133600" cy="365125"/>
+            <a:off x="914400" y="16950269"/>
+            <a:ext cx="4267200" cy="973667"/>
           </a:xfrm>
           <a:prstGeom prst="rect">
             <a:avLst/>
@@ -1053,14 +1052,13 @@
               <a:t>Step-By-Step Instructions for </a:t>
             </a:r>
             <a:r>
-              <a:rPr lang="en-US" dirty="0" err="1" smtClean="0"/>
+              <a:rPr lang="en-US" dirty="0" err="1"/>
               <a:t>Miniproject</a:t>
             </a:r>
             <a:r>
-              <a:rPr lang="en-US" dirty="0" smtClean="0"/>
+              <a:rPr lang="en-US" dirty="0"/>
               <a:t> 2</a:t>
             </a:r>
-            <a:endParaRPr lang="en-US" dirty="0"/>
           </a:p>
         </p:txBody>
       </p:sp>
@@ -1129,8 +1127,8 @@
         </p:nvSpPr>
         <p:spPr>
           <a:xfrm>
-            <a:off x="6629400" y="274638"/>
-            <a:ext cx="2057400" cy="5851525"/>
+            <a:off x="13258800" y="732370"/>
+            <a:ext cx="4114800" cy="15604067"/>
           </a:xfrm>
         </p:spPr>
         <p:txBody>
@@ -1156,8 +1154,8 @@
         </p:nvSpPr>
         <p:spPr>
           <a:xfrm>
-            <a:off x="457200" y="274638"/>
-            <a:ext cx="6019800" cy="5851525"/>
+            <a:off x="914400" y="732370"/>
+            <a:ext cx="12039600" cy="15604067"/>
           </a:xfrm>
         </p:spPr>
         <p:txBody>
@@ -1212,8 +1210,8 @@
         </p:nvSpPr>
         <p:spPr>
           <a:xfrm>
-            <a:off x="457200" y="6356350"/>
-            <a:ext cx="2133600" cy="365125"/>
+            <a:off x="914400" y="16950269"/>
+            <a:ext cx="4267200" cy="973667"/>
           </a:xfrm>
           <a:prstGeom prst="rect">
             <a:avLst/>
@@ -1247,14 +1245,13 @@
               <a:t>Step-By-Step Instructions for </a:t>
             </a:r>
             <a:r>
-              <a:rPr lang="en-US" dirty="0" err="1" smtClean="0"/>
+              <a:rPr lang="en-US" dirty="0" err="1"/>
               <a:t>Miniproject</a:t>
             </a:r>
             <a:r>
-              <a:rPr lang="en-US" dirty="0" smtClean="0"/>
+              <a:rPr lang="en-US" dirty="0"/>
               <a:t> 2</a:t>
             </a:r>
-            <a:endParaRPr lang="en-US" dirty="0"/>
           </a:p>
         </p:txBody>
       </p:sp>
@@ -1404,8 +1401,8 @@
         </p:nvSpPr>
         <p:spPr>
           <a:xfrm>
-            <a:off x="457200" y="6356350"/>
-            <a:ext cx="2133600" cy="365125"/>
+            <a:off x="914400" y="16950269"/>
+            <a:ext cx="4267200" cy="973667"/>
           </a:xfrm>
           <a:prstGeom prst="rect">
             <a:avLst/>
@@ -1439,14 +1436,13 @@
               <a:t>Step-By-Step Instructions for </a:t>
             </a:r>
             <a:r>
-              <a:rPr lang="en-US" dirty="0" err="1" smtClean="0"/>
+              <a:rPr lang="en-US" dirty="0" err="1"/>
               <a:t>Miniproject</a:t>
             </a:r>
             <a:r>
-              <a:rPr lang="en-US" dirty="0" smtClean="0"/>
+              <a:rPr lang="en-US" dirty="0"/>
               <a:t> 2</a:t>
             </a:r>
-            <a:endParaRPr lang="en-US" dirty="0"/>
           </a:p>
         </p:txBody>
       </p:sp>
@@ -1515,15 +1511,15 @@
         </p:nvSpPr>
         <p:spPr>
           <a:xfrm>
-            <a:off x="722313" y="4406900"/>
-            <a:ext cx="7772400" cy="1362075"/>
+            <a:off x="1444626" y="11751736"/>
+            <a:ext cx="15544800" cy="3632200"/>
           </a:xfrm>
         </p:spPr>
         <p:txBody>
           <a:bodyPr anchor="t"/>
           <a:lstStyle>
             <a:lvl1pPr algn="l">
-              <a:defRPr sz="4000" b="1" cap="all"/>
+              <a:defRPr sz="8000" b="1" cap="all"/>
             </a:lvl1pPr>
           </a:lstStyle>
           <a:p>
@@ -1546,8 +1542,8 @@
         </p:nvSpPr>
         <p:spPr>
           <a:xfrm>
-            <a:off x="722313" y="2906713"/>
-            <a:ext cx="7772400" cy="1500187"/>
+            <a:off x="1444626" y="7751236"/>
+            <a:ext cx="15544800" cy="4000499"/>
           </a:xfrm>
         </p:spPr>
         <p:txBody>
@@ -1555,7 +1551,7 @@
           <a:lstStyle>
             <a:lvl1pPr marL="0" indent="0">
               <a:buNone/>
-              <a:defRPr sz="2000">
+              <a:defRPr sz="4000">
                 <a:solidFill>
                   <a:schemeClr val="tx1">
                     <a:tint val="75000"/>
@@ -1563,9 +1559,9 @@
                 </a:solidFill>
               </a:defRPr>
             </a:lvl1pPr>
-            <a:lvl2pPr marL="457200" indent="0">
+            <a:lvl2pPr marL="914418" indent="0">
               <a:buNone/>
-              <a:defRPr sz="1800">
+              <a:defRPr sz="3600">
                 <a:solidFill>
                   <a:schemeClr val="tx1">
                     <a:tint val="75000"/>
@@ -1573,9 +1569,9 @@
                 </a:solidFill>
               </a:defRPr>
             </a:lvl2pPr>
-            <a:lvl3pPr marL="914400" indent="0">
+            <a:lvl3pPr marL="1828837" indent="0">
               <a:buNone/>
-              <a:defRPr sz="1600">
+              <a:defRPr sz="3200">
                 <a:solidFill>
                   <a:schemeClr val="tx1">
                     <a:tint val="75000"/>
@@ -1583,9 +1579,9 @@
                 </a:solidFill>
               </a:defRPr>
             </a:lvl3pPr>
-            <a:lvl4pPr marL="1371600" indent="0">
+            <a:lvl4pPr marL="2743255" indent="0">
               <a:buNone/>
-              <a:defRPr sz="1400">
+              <a:defRPr sz="2800">
                 <a:solidFill>
                   <a:schemeClr val="tx1">
                     <a:tint val="75000"/>
@@ -1593,9 +1589,9 @@
                 </a:solidFill>
               </a:defRPr>
             </a:lvl4pPr>
-            <a:lvl5pPr marL="1828800" indent="0">
+            <a:lvl5pPr marL="3657673" indent="0">
               <a:buNone/>
-              <a:defRPr sz="1400">
+              <a:defRPr sz="2800">
                 <a:solidFill>
                   <a:schemeClr val="tx1">
                     <a:tint val="75000"/>
@@ -1603,9 +1599,9 @@
                 </a:solidFill>
               </a:defRPr>
             </a:lvl5pPr>
-            <a:lvl6pPr marL="2286000" indent="0">
+            <a:lvl6pPr marL="4572091" indent="0">
               <a:buNone/>
-              <a:defRPr sz="1400">
+              <a:defRPr sz="2800">
                 <a:solidFill>
                   <a:schemeClr val="tx1">
                     <a:tint val="75000"/>
@@ -1613,9 +1609,9 @@
                 </a:solidFill>
               </a:defRPr>
             </a:lvl6pPr>
-            <a:lvl7pPr marL="2743200" indent="0">
+            <a:lvl7pPr marL="5486510" indent="0">
               <a:buNone/>
-              <a:defRPr sz="1400">
+              <a:defRPr sz="2800">
                 <a:solidFill>
                   <a:schemeClr val="tx1">
                     <a:tint val="75000"/>
@@ -1623,9 +1619,9 @@
                 </a:solidFill>
               </a:defRPr>
             </a:lvl7pPr>
-            <a:lvl8pPr marL="3200400" indent="0">
+            <a:lvl8pPr marL="6400928" indent="0">
               <a:buNone/>
-              <a:defRPr sz="1400">
+              <a:defRPr sz="2800">
                 <a:solidFill>
                   <a:schemeClr val="tx1">
                     <a:tint val="75000"/>
@@ -1633,9 +1629,9 @@
                 </a:solidFill>
               </a:defRPr>
             </a:lvl8pPr>
-            <a:lvl9pPr marL="3657600" indent="0">
+            <a:lvl9pPr marL="7315346" indent="0">
               <a:buNone/>
-              <a:defRPr sz="1400">
+              <a:defRPr sz="2800">
                 <a:solidFill>
                   <a:schemeClr val="tx1">
                     <a:tint val="75000"/>
@@ -1665,8 +1661,8 @@
         </p:nvSpPr>
         <p:spPr>
           <a:xfrm>
-            <a:off x="457200" y="6356350"/>
-            <a:ext cx="2133600" cy="365125"/>
+            <a:off x="914400" y="16950269"/>
+            <a:ext cx="4267200" cy="973667"/>
           </a:xfrm>
           <a:prstGeom prst="rect">
             <a:avLst/>
@@ -1700,14 +1696,13 @@
               <a:t>Step-By-Step Instructions for </a:t>
             </a:r>
             <a:r>
-              <a:rPr lang="en-US" dirty="0" err="1" smtClean="0"/>
+              <a:rPr lang="en-US" dirty="0" err="1"/>
               <a:t>Miniproject</a:t>
             </a:r>
             <a:r>
-              <a:rPr lang="en-US" dirty="0" smtClean="0"/>
+              <a:rPr lang="en-US" dirty="0"/>
               <a:t> 2</a:t>
             </a:r>
-            <a:endParaRPr lang="en-US" dirty="0"/>
           </a:p>
         </p:txBody>
       </p:sp>
@@ -1798,39 +1793,39 @@
         </p:nvSpPr>
         <p:spPr>
           <a:xfrm>
-            <a:off x="457200" y="1600200"/>
-            <a:ext cx="4038600" cy="4525963"/>
+            <a:off x="914400" y="4267202"/>
+            <a:ext cx="8077200" cy="12069234"/>
           </a:xfrm>
         </p:spPr>
         <p:txBody>
           <a:bodyPr/>
           <a:lstStyle>
             <a:lvl1pPr>
-              <a:defRPr sz="2800"/>
+              <a:defRPr sz="5600"/>
             </a:lvl1pPr>
             <a:lvl2pPr>
-              <a:defRPr sz="2400"/>
+              <a:defRPr sz="4800"/>
             </a:lvl2pPr>
             <a:lvl3pPr>
-              <a:defRPr sz="2000"/>
+              <a:defRPr sz="4000"/>
             </a:lvl3pPr>
             <a:lvl4pPr>
-              <a:defRPr sz="1800"/>
+              <a:defRPr sz="3600"/>
             </a:lvl4pPr>
             <a:lvl5pPr>
-              <a:defRPr sz="1800"/>
+              <a:defRPr sz="3600"/>
             </a:lvl5pPr>
             <a:lvl6pPr>
-              <a:defRPr sz="1800"/>
+              <a:defRPr sz="3600"/>
             </a:lvl6pPr>
             <a:lvl7pPr>
-              <a:defRPr sz="1800"/>
+              <a:defRPr sz="3600"/>
             </a:lvl7pPr>
             <a:lvl8pPr>
-              <a:defRPr sz="1800"/>
+              <a:defRPr sz="3600"/>
             </a:lvl8pPr>
             <a:lvl9pPr>
-              <a:defRPr sz="1800"/>
+              <a:defRPr sz="3600"/>
             </a:lvl9pPr>
           </a:lstStyle>
           <a:p>
@@ -1882,39 +1877,39 @@
         </p:nvSpPr>
         <p:spPr>
           <a:xfrm>
-            <a:off x="4648200" y="1600200"/>
-            <a:ext cx="4038600" cy="4525963"/>
+            <a:off x="9296400" y="4267202"/>
+            <a:ext cx="8077200" cy="12069234"/>
           </a:xfrm>
         </p:spPr>
         <p:txBody>
           <a:bodyPr/>
           <a:lstStyle>
             <a:lvl1pPr>
-              <a:defRPr sz="2800"/>
+              <a:defRPr sz="5600"/>
             </a:lvl1pPr>
             <a:lvl2pPr>
-              <a:defRPr sz="2400"/>
+              <a:defRPr sz="4800"/>
             </a:lvl2pPr>
             <a:lvl3pPr>
-              <a:defRPr sz="2000"/>
+              <a:defRPr sz="4000"/>
             </a:lvl3pPr>
             <a:lvl4pPr>
-              <a:defRPr sz="1800"/>
+              <a:defRPr sz="3600"/>
             </a:lvl4pPr>
             <a:lvl5pPr>
-              <a:defRPr sz="1800"/>
+              <a:defRPr sz="3600"/>
             </a:lvl5pPr>
             <a:lvl6pPr>
-              <a:defRPr sz="1800"/>
+              <a:defRPr sz="3600"/>
             </a:lvl6pPr>
             <a:lvl7pPr>
-              <a:defRPr sz="1800"/>
+              <a:defRPr sz="3600"/>
             </a:lvl7pPr>
             <a:lvl8pPr>
-              <a:defRPr sz="1800"/>
+              <a:defRPr sz="3600"/>
             </a:lvl8pPr>
             <a:lvl9pPr>
-              <a:defRPr sz="1800"/>
+              <a:defRPr sz="3600"/>
             </a:lvl9pPr>
           </a:lstStyle>
           <a:p>
@@ -1966,8 +1961,8 @@
         </p:nvSpPr>
         <p:spPr>
           <a:xfrm>
-            <a:off x="457200" y="6356350"/>
-            <a:ext cx="2133600" cy="365125"/>
+            <a:off x="914400" y="16950269"/>
+            <a:ext cx="4267200" cy="973667"/>
           </a:xfrm>
           <a:prstGeom prst="rect">
             <a:avLst/>
@@ -2001,14 +1996,13 @@
               <a:t>Step-By-Step Instructions for </a:t>
             </a:r>
             <a:r>
-              <a:rPr lang="en-US" dirty="0" err="1" smtClean="0"/>
+              <a:rPr lang="en-US" dirty="0" err="1"/>
               <a:t>Miniproject</a:t>
             </a:r>
             <a:r>
-              <a:rPr lang="en-US" dirty="0" smtClean="0"/>
+              <a:rPr lang="en-US" dirty="0"/>
               <a:t> 2</a:t>
             </a:r>
-            <a:endParaRPr lang="en-US" dirty="0"/>
           </a:p>
         </p:txBody>
       </p:sp>
@@ -2103,8 +2097,8 @@
         </p:nvSpPr>
         <p:spPr>
           <a:xfrm>
-            <a:off x="457200" y="1535113"/>
-            <a:ext cx="4040188" cy="639762"/>
+            <a:off x="914401" y="4093635"/>
+            <a:ext cx="8080376" cy="1706032"/>
           </a:xfrm>
         </p:spPr>
         <p:txBody>
@@ -2112,39 +2106,39 @@
           <a:lstStyle>
             <a:lvl1pPr marL="0" indent="0">
               <a:buNone/>
-              <a:defRPr sz="2400" b="1"/>
+              <a:defRPr sz="4800" b="1"/>
             </a:lvl1pPr>
-            <a:lvl2pPr marL="457200" indent="0">
+            <a:lvl2pPr marL="914418" indent="0">
               <a:buNone/>
-              <a:defRPr sz="2000" b="1"/>
+              <a:defRPr sz="4000" b="1"/>
             </a:lvl2pPr>
-            <a:lvl3pPr marL="914400" indent="0">
+            <a:lvl3pPr marL="1828837" indent="0">
               <a:buNone/>
-              <a:defRPr sz="1800" b="1"/>
+              <a:defRPr sz="3600" b="1"/>
             </a:lvl3pPr>
-            <a:lvl4pPr marL="1371600" indent="0">
+            <a:lvl4pPr marL="2743255" indent="0">
               <a:buNone/>
-              <a:defRPr sz="1600" b="1"/>
+              <a:defRPr sz="3200" b="1"/>
             </a:lvl4pPr>
-            <a:lvl5pPr marL="1828800" indent="0">
+            <a:lvl5pPr marL="3657673" indent="0">
               <a:buNone/>
-              <a:defRPr sz="1600" b="1"/>
+              <a:defRPr sz="3200" b="1"/>
             </a:lvl5pPr>
-            <a:lvl6pPr marL="2286000" indent="0">
+            <a:lvl6pPr marL="4572091" indent="0">
               <a:buNone/>
-              <a:defRPr sz="1600" b="1"/>
+              <a:defRPr sz="3200" b="1"/>
             </a:lvl6pPr>
-            <a:lvl7pPr marL="2743200" indent="0">
+            <a:lvl7pPr marL="5486510" indent="0">
               <a:buNone/>
-              <a:defRPr sz="1600" b="1"/>
+              <a:defRPr sz="3200" b="1"/>
             </a:lvl7pPr>
-            <a:lvl8pPr marL="3200400" indent="0">
+            <a:lvl8pPr marL="6400928" indent="0">
               <a:buNone/>
-              <a:defRPr sz="1600" b="1"/>
+              <a:defRPr sz="3200" b="1"/>
             </a:lvl8pPr>
-            <a:lvl9pPr marL="3657600" indent="0">
+            <a:lvl9pPr marL="7315346" indent="0">
               <a:buNone/>
-              <a:defRPr sz="1600" b="1"/>
+              <a:defRPr sz="3200" b="1"/>
             </a:lvl9pPr>
           </a:lstStyle>
           <a:p>
@@ -2168,39 +2162,39 @@
         </p:nvSpPr>
         <p:spPr>
           <a:xfrm>
-            <a:off x="457200" y="2174875"/>
-            <a:ext cx="4040188" cy="3951288"/>
+            <a:off x="914401" y="5799667"/>
+            <a:ext cx="8080376" cy="10536768"/>
           </a:xfrm>
         </p:spPr>
         <p:txBody>
           <a:bodyPr/>
           <a:lstStyle>
             <a:lvl1pPr>
-              <a:defRPr sz="2400"/>
+              <a:defRPr sz="4800"/>
             </a:lvl1pPr>
             <a:lvl2pPr>
-              <a:defRPr sz="2000"/>
+              <a:defRPr sz="4000"/>
             </a:lvl2pPr>
             <a:lvl3pPr>
-              <a:defRPr sz="1800"/>
+              <a:defRPr sz="3600"/>
             </a:lvl3pPr>
             <a:lvl4pPr>
-              <a:defRPr sz="1600"/>
+              <a:defRPr sz="3200"/>
             </a:lvl4pPr>
             <a:lvl5pPr>
-              <a:defRPr sz="1600"/>
+              <a:defRPr sz="3200"/>
             </a:lvl5pPr>
             <a:lvl6pPr>
-              <a:defRPr sz="1600"/>
+              <a:defRPr sz="3200"/>
             </a:lvl6pPr>
             <a:lvl7pPr>
-              <a:defRPr sz="1600"/>
+              <a:defRPr sz="3200"/>
             </a:lvl7pPr>
             <a:lvl8pPr>
-              <a:defRPr sz="1600"/>
+              <a:defRPr sz="3200"/>
             </a:lvl8pPr>
             <a:lvl9pPr>
-              <a:defRPr sz="1600"/>
+              <a:defRPr sz="3200"/>
             </a:lvl9pPr>
           </a:lstStyle>
           <a:p>
@@ -2252,8 +2246,8 @@
         </p:nvSpPr>
         <p:spPr>
           <a:xfrm>
-            <a:off x="4645025" y="1535113"/>
-            <a:ext cx="4041775" cy="639762"/>
+            <a:off x="9290052" y="4093635"/>
+            <a:ext cx="8083550" cy="1706032"/>
           </a:xfrm>
         </p:spPr>
         <p:txBody>
@@ -2261,39 +2255,39 @@
           <a:lstStyle>
             <a:lvl1pPr marL="0" indent="0">
               <a:buNone/>
-              <a:defRPr sz="2400" b="1"/>
+              <a:defRPr sz="4800" b="1"/>
             </a:lvl1pPr>
-            <a:lvl2pPr marL="457200" indent="0">
+            <a:lvl2pPr marL="914418" indent="0">
               <a:buNone/>
-              <a:defRPr sz="2000" b="1"/>
+              <a:defRPr sz="4000" b="1"/>
             </a:lvl2pPr>
-            <a:lvl3pPr marL="914400" indent="0">
+            <a:lvl3pPr marL="1828837" indent="0">
               <a:buNone/>
-              <a:defRPr sz="1800" b="1"/>
+              <a:defRPr sz="3600" b="1"/>
             </a:lvl3pPr>
-            <a:lvl4pPr marL="1371600" indent="0">
+            <a:lvl4pPr marL="2743255" indent="0">
               <a:buNone/>
-              <a:defRPr sz="1600" b="1"/>
+              <a:defRPr sz="3200" b="1"/>
             </a:lvl4pPr>
-            <a:lvl5pPr marL="1828800" indent="0">
+            <a:lvl5pPr marL="3657673" indent="0">
               <a:buNone/>
-              <a:defRPr sz="1600" b="1"/>
+              <a:defRPr sz="3200" b="1"/>
             </a:lvl5pPr>
-            <a:lvl6pPr marL="2286000" indent="0">
+            <a:lvl6pPr marL="4572091" indent="0">
               <a:buNone/>
-              <a:defRPr sz="1600" b="1"/>
+              <a:defRPr sz="3200" b="1"/>
             </a:lvl6pPr>
-            <a:lvl7pPr marL="2743200" indent="0">
+            <a:lvl7pPr marL="5486510" indent="0">
               <a:buNone/>
-              <a:defRPr sz="1600" b="1"/>
+              <a:defRPr sz="3200" b="1"/>
             </a:lvl7pPr>
-            <a:lvl8pPr marL="3200400" indent="0">
+            <a:lvl8pPr marL="6400928" indent="0">
               <a:buNone/>
-              <a:defRPr sz="1600" b="1"/>
+              <a:defRPr sz="3200" b="1"/>
             </a:lvl8pPr>
-            <a:lvl9pPr marL="3657600" indent="0">
+            <a:lvl9pPr marL="7315346" indent="0">
               <a:buNone/>
-              <a:defRPr sz="1600" b="1"/>
+              <a:defRPr sz="3200" b="1"/>
             </a:lvl9pPr>
           </a:lstStyle>
           <a:p>
@@ -2317,39 +2311,39 @@
         </p:nvSpPr>
         <p:spPr>
           <a:xfrm>
-            <a:off x="4645025" y="2174875"/>
-            <a:ext cx="4041775" cy="3951288"/>
+            <a:off x="9290052" y="5799667"/>
+            <a:ext cx="8083550" cy="10536768"/>
           </a:xfrm>
         </p:spPr>
         <p:txBody>
           <a:bodyPr/>
           <a:lstStyle>
             <a:lvl1pPr>
-              <a:defRPr sz="2400"/>
+              <a:defRPr sz="4800"/>
             </a:lvl1pPr>
             <a:lvl2pPr>
-              <a:defRPr sz="2000"/>
+              <a:defRPr sz="4000"/>
             </a:lvl2pPr>
             <a:lvl3pPr>
-              <a:defRPr sz="1800"/>
+              <a:defRPr sz="3600"/>
             </a:lvl3pPr>
             <a:lvl4pPr>
-              <a:defRPr sz="1600"/>
+              <a:defRPr sz="3200"/>
             </a:lvl4pPr>
             <a:lvl5pPr>
-              <a:defRPr sz="1600"/>
+              <a:defRPr sz="3200"/>
             </a:lvl5pPr>
             <a:lvl6pPr>
-              <a:defRPr sz="1600"/>
+              <a:defRPr sz="3200"/>
             </a:lvl6pPr>
             <a:lvl7pPr>
-              <a:defRPr sz="1600"/>
+              <a:defRPr sz="3200"/>
             </a:lvl7pPr>
             <a:lvl8pPr>
-              <a:defRPr sz="1600"/>
+              <a:defRPr sz="3200"/>
             </a:lvl8pPr>
             <a:lvl9pPr>
-              <a:defRPr sz="1600"/>
+              <a:defRPr sz="3200"/>
             </a:lvl9pPr>
           </a:lstStyle>
           <a:p>
@@ -2401,8 +2395,8 @@
         </p:nvSpPr>
         <p:spPr>
           <a:xfrm>
-            <a:off x="457200" y="6356350"/>
-            <a:ext cx="2133600" cy="365125"/>
+            <a:off x="914400" y="16950269"/>
+            <a:ext cx="4267200" cy="973667"/>
           </a:xfrm>
           <a:prstGeom prst="rect">
             <a:avLst/>
@@ -2436,14 +2430,13 @@
               <a:t>Step-By-Step Instructions for </a:t>
             </a:r>
             <a:r>
-              <a:rPr lang="en-US" dirty="0" err="1" smtClean="0"/>
+              <a:rPr lang="en-US" dirty="0" err="1"/>
               <a:t>Miniproject</a:t>
             </a:r>
             <a:r>
-              <a:rPr lang="en-US" dirty="0" smtClean="0"/>
+              <a:rPr lang="en-US" dirty="0"/>
               <a:t> 2</a:t>
             </a:r>
-            <a:endParaRPr lang="en-US" dirty="0"/>
           </a:p>
         </p:txBody>
       </p:sp>
@@ -2534,8 +2527,8 @@
         </p:nvSpPr>
         <p:spPr>
           <a:xfrm>
-            <a:off x="457200" y="6356350"/>
-            <a:ext cx="2133600" cy="365125"/>
+            <a:off x="914400" y="16950269"/>
+            <a:ext cx="4267200" cy="973667"/>
           </a:xfrm>
           <a:prstGeom prst="rect">
             <a:avLst/>
@@ -2569,14 +2562,13 @@
               <a:t>Step-By-Step Instructions for </a:t>
             </a:r>
             <a:r>
-              <a:rPr lang="en-US" dirty="0" err="1" smtClean="0"/>
+              <a:rPr lang="en-US" dirty="0" err="1"/>
               <a:t>Miniproject</a:t>
             </a:r>
             <a:r>
-              <a:rPr lang="en-US" dirty="0" smtClean="0"/>
+              <a:rPr lang="en-US" dirty="0"/>
               <a:t> 2</a:t>
             </a:r>
-            <a:endParaRPr lang="en-US" dirty="0"/>
           </a:p>
         </p:txBody>
       </p:sp>
@@ -2645,8 +2637,8 @@
         </p:nvSpPr>
         <p:spPr>
           <a:xfrm>
-            <a:off x="457200" y="6356350"/>
-            <a:ext cx="2133600" cy="365125"/>
+            <a:off x="914400" y="16950269"/>
+            <a:ext cx="4267200" cy="973667"/>
           </a:xfrm>
           <a:prstGeom prst="rect">
             <a:avLst/>
@@ -2680,14 +2672,13 @@
               <a:t>Step-By-Step Instructions for </a:t>
             </a:r>
             <a:r>
-              <a:rPr lang="en-US" dirty="0" err="1" smtClean="0"/>
+              <a:rPr lang="en-US" dirty="0" err="1"/>
               <a:t>Miniproject</a:t>
             </a:r>
             <a:r>
-              <a:rPr lang="en-US" dirty="0" smtClean="0"/>
+              <a:rPr lang="en-US" dirty="0"/>
               <a:t> 2</a:t>
             </a:r>
-            <a:endParaRPr lang="en-US" dirty="0"/>
           </a:p>
         </p:txBody>
       </p:sp>
@@ -2756,15 +2747,15 @@
         </p:nvSpPr>
         <p:spPr>
           <a:xfrm>
-            <a:off x="457200" y="273050"/>
-            <a:ext cx="3008313" cy="1162050"/>
+            <a:off x="914401" y="728133"/>
+            <a:ext cx="6016626" cy="3098800"/>
           </a:xfrm>
         </p:spPr>
         <p:txBody>
           <a:bodyPr anchor="b"/>
           <a:lstStyle>
             <a:lvl1pPr algn="l">
-              <a:defRPr sz="2000" b="1"/>
+              <a:defRPr sz="4000" b="1"/>
             </a:lvl1pPr>
           </a:lstStyle>
           <a:p>
@@ -2787,39 +2778,39 @@
         </p:nvSpPr>
         <p:spPr>
           <a:xfrm>
-            <a:off x="3575050" y="273050"/>
-            <a:ext cx="5111750" cy="5853113"/>
+            <a:off x="7150100" y="728135"/>
+            <a:ext cx="10223500" cy="15608301"/>
           </a:xfrm>
         </p:spPr>
         <p:txBody>
           <a:bodyPr/>
           <a:lstStyle>
             <a:lvl1pPr>
-              <a:defRPr sz="3200"/>
+              <a:defRPr sz="6400"/>
             </a:lvl1pPr>
             <a:lvl2pPr>
-              <a:defRPr sz="2800"/>
+              <a:defRPr sz="5600"/>
             </a:lvl2pPr>
             <a:lvl3pPr>
-              <a:defRPr sz="2400"/>
+              <a:defRPr sz="4800"/>
             </a:lvl3pPr>
             <a:lvl4pPr>
-              <a:defRPr sz="2000"/>
+              <a:defRPr sz="4000"/>
             </a:lvl4pPr>
             <a:lvl5pPr>
-              <a:defRPr sz="2000"/>
+              <a:defRPr sz="4000"/>
             </a:lvl5pPr>
             <a:lvl6pPr>
-              <a:defRPr sz="2000"/>
+              <a:defRPr sz="4000"/>
             </a:lvl6pPr>
             <a:lvl7pPr>
-              <a:defRPr sz="2000"/>
+              <a:defRPr sz="4000"/>
             </a:lvl7pPr>
             <a:lvl8pPr>
-              <a:defRPr sz="2000"/>
+              <a:defRPr sz="4000"/>
             </a:lvl8pPr>
             <a:lvl9pPr>
-              <a:defRPr sz="2000"/>
+              <a:defRPr sz="4000"/>
             </a:lvl9pPr>
           </a:lstStyle>
           <a:p>
@@ -2871,8 +2862,8 @@
         </p:nvSpPr>
         <p:spPr>
           <a:xfrm>
-            <a:off x="457200" y="1435100"/>
-            <a:ext cx="3008313" cy="4691063"/>
+            <a:off x="914401" y="3826935"/>
+            <a:ext cx="6016626" cy="12509501"/>
           </a:xfrm>
         </p:spPr>
         <p:txBody>
@@ -2880,39 +2871,39 @@
           <a:lstStyle>
             <a:lvl1pPr marL="0" indent="0">
               <a:buNone/>
-              <a:defRPr sz="1400"/>
+              <a:defRPr sz="2800"/>
             </a:lvl1pPr>
-            <a:lvl2pPr marL="457200" indent="0">
+            <a:lvl2pPr marL="914418" indent="0">
               <a:buNone/>
-              <a:defRPr sz="1200"/>
+              <a:defRPr sz="2400"/>
             </a:lvl2pPr>
-            <a:lvl3pPr marL="914400" indent="0">
+            <a:lvl3pPr marL="1828837" indent="0">
               <a:buNone/>
-              <a:defRPr sz="1000"/>
+              <a:defRPr sz="2000"/>
             </a:lvl3pPr>
-            <a:lvl4pPr marL="1371600" indent="0">
+            <a:lvl4pPr marL="2743255" indent="0">
               <a:buNone/>
-              <a:defRPr sz="900"/>
+              <a:defRPr sz="1800"/>
             </a:lvl4pPr>
-            <a:lvl5pPr marL="1828800" indent="0">
+            <a:lvl5pPr marL="3657673" indent="0">
               <a:buNone/>
-              <a:defRPr sz="900"/>
+              <a:defRPr sz="1800"/>
             </a:lvl5pPr>
-            <a:lvl6pPr marL="2286000" indent="0">
+            <a:lvl6pPr marL="4572091" indent="0">
               <a:buNone/>
-              <a:defRPr sz="900"/>
+              <a:defRPr sz="1800"/>
             </a:lvl6pPr>
-            <a:lvl7pPr marL="2743200" indent="0">
+            <a:lvl7pPr marL="5486510" indent="0">
               <a:buNone/>
-              <a:defRPr sz="900"/>
+              <a:defRPr sz="1800"/>
             </a:lvl7pPr>
-            <a:lvl8pPr marL="3200400" indent="0">
+            <a:lvl8pPr marL="6400928" indent="0">
               <a:buNone/>
-              <a:defRPr sz="900"/>
+              <a:defRPr sz="1800"/>
             </a:lvl8pPr>
-            <a:lvl9pPr marL="3657600" indent="0">
+            <a:lvl9pPr marL="7315346" indent="0">
               <a:buNone/>
-              <a:defRPr sz="900"/>
+              <a:defRPr sz="1800"/>
             </a:lvl9pPr>
           </a:lstStyle>
           <a:p>
@@ -2936,8 +2927,8 @@
         </p:nvSpPr>
         <p:spPr>
           <a:xfrm>
-            <a:off x="457200" y="6356350"/>
-            <a:ext cx="2133600" cy="365125"/>
+            <a:off x="914400" y="16950269"/>
+            <a:ext cx="4267200" cy="973667"/>
           </a:xfrm>
           <a:prstGeom prst="rect">
             <a:avLst/>
@@ -2971,14 +2962,13 @@
               <a:t>Step-By-Step Instructions for </a:t>
             </a:r>
             <a:r>
-              <a:rPr lang="en-US" dirty="0" err="1" smtClean="0"/>
+              <a:rPr lang="en-US" dirty="0" err="1"/>
               <a:t>Miniproject</a:t>
             </a:r>
             <a:r>
-              <a:rPr lang="en-US" dirty="0" smtClean="0"/>
+              <a:rPr lang="en-US" dirty="0"/>
               <a:t> 2</a:t>
             </a:r>
-            <a:endParaRPr lang="en-US" dirty="0"/>
           </a:p>
         </p:txBody>
       </p:sp>
@@ -3047,15 +3037,15 @@
         </p:nvSpPr>
         <p:spPr>
           <a:xfrm>
-            <a:off x="1792288" y="4800600"/>
-            <a:ext cx="5486400" cy="566738"/>
+            <a:off x="3584576" y="12801601"/>
+            <a:ext cx="10972800" cy="1511301"/>
           </a:xfrm>
         </p:spPr>
         <p:txBody>
           <a:bodyPr anchor="b"/>
           <a:lstStyle>
             <a:lvl1pPr algn="l">
-              <a:defRPr sz="2000" b="1"/>
+              <a:defRPr sz="4000" b="1"/>
             </a:lvl1pPr>
           </a:lstStyle>
           <a:p>
@@ -3078,8 +3068,8 @@
         </p:nvSpPr>
         <p:spPr>
           <a:xfrm>
-            <a:off x="1792288" y="612775"/>
-            <a:ext cx="5486400" cy="4114800"/>
+            <a:off x="3584576" y="1634067"/>
+            <a:ext cx="10972800" cy="10972800"/>
           </a:xfrm>
         </p:spPr>
         <p:txBody>
@@ -3087,39 +3077,39 @@
           <a:lstStyle>
             <a:lvl1pPr marL="0" indent="0">
               <a:buNone/>
-              <a:defRPr sz="3200"/>
+              <a:defRPr sz="6400"/>
             </a:lvl1pPr>
-            <a:lvl2pPr marL="457200" indent="0">
+            <a:lvl2pPr marL="914418" indent="0">
               <a:buNone/>
-              <a:defRPr sz="2800"/>
+              <a:defRPr sz="5600"/>
             </a:lvl2pPr>
-            <a:lvl3pPr marL="914400" indent="0">
+            <a:lvl3pPr marL="1828837" indent="0">
               <a:buNone/>
-              <a:defRPr sz="2400"/>
+              <a:defRPr sz="4800"/>
             </a:lvl3pPr>
-            <a:lvl4pPr marL="1371600" indent="0">
+            <a:lvl4pPr marL="2743255" indent="0">
               <a:buNone/>
-              <a:defRPr sz="2000"/>
+              <a:defRPr sz="4000"/>
             </a:lvl4pPr>
-            <a:lvl5pPr marL="1828800" indent="0">
+            <a:lvl5pPr marL="3657673" indent="0">
               <a:buNone/>
-              <a:defRPr sz="2000"/>
+              <a:defRPr sz="4000"/>
             </a:lvl5pPr>
-            <a:lvl6pPr marL="2286000" indent="0">
+            <a:lvl6pPr marL="4572091" indent="0">
               <a:buNone/>
-              <a:defRPr sz="2000"/>
+              <a:defRPr sz="4000"/>
             </a:lvl6pPr>
-            <a:lvl7pPr marL="2743200" indent="0">
+            <a:lvl7pPr marL="5486510" indent="0">
               <a:buNone/>
-              <a:defRPr sz="2000"/>
+              <a:defRPr sz="4000"/>
             </a:lvl7pPr>
-            <a:lvl8pPr marL="3200400" indent="0">
+            <a:lvl8pPr marL="6400928" indent="0">
               <a:buNone/>
-              <a:defRPr sz="2000"/>
+              <a:defRPr sz="4000"/>
             </a:lvl8pPr>
-            <a:lvl9pPr marL="3657600" indent="0">
+            <a:lvl9pPr marL="7315346" indent="0">
               <a:buNone/>
-              <a:defRPr sz="2000"/>
+              <a:defRPr sz="4000"/>
             </a:lvl9pPr>
           </a:lstStyle>
           <a:p>
@@ -3139,8 +3129,8 @@
         </p:nvSpPr>
         <p:spPr>
           <a:xfrm>
-            <a:off x="1792288" y="5367338"/>
-            <a:ext cx="5486400" cy="804862"/>
+            <a:off x="3584576" y="14312902"/>
+            <a:ext cx="10972800" cy="2146299"/>
           </a:xfrm>
         </p:spPr>
         <p:txBody>
@@ -3148,39 +3138,39 @@
           <a:lstStyle>
             <a:lvl1pPr marL="0" indent="0">
               <a:buNone/>
-              <a:defRPr sz="1400"/>
+              <a:defRPr sz="2800"/>
             </a:lvl1pPr>
-            <a:lvl2pPr marL="457200" indent="0">
+            <a:lvl2pPr marL="914418" indent="0">
               <a:buNone/>
-              <a:defRPr sz="1200"/>
+              <a:defRPr sz="2400"/>
             </a:lvl2pPr>
-            <a:lvl3pPr marL="914400" indent="0">
+            <a:lvl3pPr marL="1828837" indent="0">
               <a:buNone/>
-              <a:defRPr sz="1000"/>
+              <a:defRPr sz="2000"/>
             </a:lvl3pPr>
-            <a:lvl4pPr marL="1371600" indent="0">
+            <a:lvl4pPr marL="2743255" indent="0">
               <a:buNone/>
-              <a:defRPr sz="900"/>
+              <a:defRPr sz="1800"/>
             </a:lvl4pPr>
-            <a:lvl5pPr marL="1828800" indent="0">
+            <a:lvl5pPr marL="3657673" indent="0">
               <a:buNone/>
-              <a:defRPr sz="900"/>
+              <a:defRPr sz="1800"/>
             </a:lvl5pPr>
-            <a:lvl6pPr marL="2286000" indent="0">
+            <a:lvl6pPr marL="4572091" indent="0">
               <a:buNone/>
-              <a:defRPr sz="900"/>
+              <a:defRPr sz="1800"/>
             </a:lvl6pPr>
-            <a:lvl7pPr marL="2743200" indent="0">
+            <a:lvl7pPr marL="5486510" indent="0">
               <a:buNone/>
-              <a:defRPr sz="900"/>
+              <a:defRPr sz="1800"/>
             </a:lvl7pPr>
-            <a:lvl8pPr marL="3200400" indent="0">
+            <a:lvl8pPr marL="6400928" indent="0">
               <a:buNone/>
-              <a:defRPr sz="900"/>
+              <a:defRPr sz="1800"/>
             </a:lvl8pPr>
-            <a:lvl9pPr marL="3657600" indent="0">
+            <a:lvl9pPr marL="7315346" indent="0">
               <a:buNone/>
-              <a:defRPr sz="900"/>
+              <a:defRPr sz="1800"/>
             </a:lvl9pPr>
           </a:lstStyle>
           <a:p>
@@ -3204,8 +3194,8 @@
         </p:nvSpPr>
         <p:spPr>
           <a:xfrm>
-            <a:off x="457200" y="6356350"/>
-            <a:ext cx="2133600" cy="365125"/>
+            <a:off x="914400" y="16950269"/>
+            <a:ext cx="4267200" cy="973667"/>
           </a:xfrm>
           <a:prstGeom prst="rect">
             <a:avLst/>
@@ -3239,14 +3229,13 @@
               <a:t>Step-By-Step Instructions for </a:t>
             </a:r>
             <a:r>
-              <a:rPr lang="en-US" dirty="0" err="1" smtClean="0"/>
+              <a:rPr lang="en-US" dirty="0" err="1"/>
               <a:t>Miniproject</a:t>
             </a:r>
             <a:r>
-              <a:rPr lang="en-US" dirty="0" smtClean="0"/>
+              <a:rPr lang="en-US" dirty="0"/>
               <a:t> 2</a:t>
             </a:r>
-            <a:endParaRPr lang="en-US" dirty="0"/>
           </a:p>
         </p:txBody>
       </p:sp>
@@ -3320,8 +3309,8 @@
         </p:nvSpPr>
         <p:spPr>
           <a:xfrm>
-            <a:off x="457200" y="274638"/>
-            <a:ext cx="8229600" cy="1143000"/>
+            <a:off x="914400" y="732368"/>
+            <a:ext cx="16459200" cy="3048000"/>
           </a:xfrm>
           <a:prstGeom prst="rect">
             <a:avLst/>
@@ -3352,8 +3341,8 @@
         </p:nvSpPr>
         <p:spPr>
           <a:xfrm>
-            <a:off x="457200" y="1600200"/>
-            <a:ext cx="8229600" cy="4525963"/>
+            <a:off x="914400" y="4267202"/>
+            <a:ext cx="16459200" cy="12069234"/>
           </a:xfrm>
           <a:prstGeom prst="rect">
             <a:avLst/>
@@ -3413,8 +3402,8 @@
         </p:nvSpPr>
         <p:spPr>
           <a:xfrm>
-            <a:off x="457200" y="6356350"/>
-            <a:ext cx="2975429" cy="365125"/>
+            <a:off x="914402" y="16950269"/>
+            <a:ext cx="5950859" cy="973667"/>
           </a:xfrm>
           <a:prstGeom prst="rect">
             <a:avLst/>
@@ -3424,7 +3413,7 @@
           <a:bodyPr vert="horz" lIns="91440" tIns="45720" rIns="91440" bIns="45720" rtlCol="0" anchor="ctr"/>
           <a:lstStyle>
             <a:lvl1pPr algn="ctr">
-              <a:defRPr sz="1200">
+              <a:defRPr sz="2400">
                 <a:solidFill>
                   <a:schemeClr val="tx1">
                     <a:tint val="75000"/>
@@ -3439,14 +3428,13 @@
               <a:t>Step-By-Step Instructions for </a:t>
             </a:r>
             <a:r>
-              <a:rPr lang="en-US" dirty="0" err="1" smtClean="0"/>
+              <a:rPr lang="en-US" dirty="0" err="1"/>
               <a:t>Miniproject</a:t>
             </a:r>
             <a:r>
-              <a:rPr lang="en-US" dirty="0" smtClean="0"/>
+              <a:rPr lang="en-US" dirty="0"/>
               <a:t> 2</a:t>
             </a:r>
-            <a:endParaRPr lang="en-US" dirty="0"/>
           </a:p>
         </p:txBody>
       </p:sp>
@@ -3462,8 +3450,8 @@
         </p:nvSpPr>
         <p:spPr>
           <a:xfrm>
-            <a:off x="6553200" y="6356350"/>
-            <a:ext cx="2133600" cy="365125"/>
+            <a:off x="13106400" y="16950269"/>
+            <a:ext cx="4267200" cy="973667"/>
           </a:xfrm>
           <a:prstGeom prst="rect">
             <a:avLst/>
@@ -3473,7 +3461,7 @@
           <a:bodyPr vert="horz" lIns="91440" tIns="45720" rIns="91440" bIns="45720" rtlCol="0" anchor="ctr"/>
           <a:lstStyle>
             <a:lvl1pPr algn="r">
-              <a:defRPr sz="1200">
+              <a:defRPr sz="2400">
                 <a:solidFill>
                   <a:schemeClr val="tx1">
                     <a:tint val="75000"/>
@@ -3515,12 +3503,12 @@
   <p:hf hdr="0" dt="0"/>
   <p:txStyles>
     <p:titleStyle>
-      <a:lvl1pPr algn="ctr" defTabSz="457200" rtl="0" eaLnBrk="1" latinLnBrk="0" hangingPunct="1">
+      <a:lvl1pPr algn="ctr" defTabSz="914418" rtl="0" eaLnBrk="1" latinLnBrk="0" hangingPunct="1">
         <a:spcBef>
           <a:spcPct val="0"/>
         </a:spcBef>
         <a:buNone/>
-        <a:defRPr sz="4400" kern="1200">
+        <a:defRPr sz="8800" kern="1200">
           <a:solidFill>
             <a:schemeClr val="tx1"/>
           </a:solidFill>
@@ -3531,13 +3519,13 @@
       </a:lvl1pPr>
     </p:titleStyle>
     <p:bodyStyle>
-      <a:lvl1pPr marL="342900" indent="-342900" algn="l" defTabSz="457200" rtl="0" eaLnBrk="1" latinLnBrk="0" hangingPunct="1">
+      <a:lvl1pPr marL="685814" indent="-685814" algn="l" defTabSz="914418" rtl="0" eaLnBrk="1" latinLnBrk="0" hangingPunct="1">
         <a:spcBef>
           <a:spcPct val="20000"/>
         </a:spcBef>
         <a:buFont typeface="Arial"/>
         <a:buChar char="•"/>
-        <a:defRPr sz="3200" kern="1200">
+        <a:defRPr sz="6400" kern="1200">
           <a:solidFill>
             <a:schemeClr val="tx1"/>
           </a:solidFill>
@@ -3546,13 +3534,13 @@
           <a:cs typeface="+mn-cs"/>
         </a:defRPr>
       </a:lvl1pPr>
-      <a:lvl2pPr marL="742950" indent="-285750" algn="l" defTabSz="457200" rtl="0" eaLnBrk="1" latinLnBrk="0" hangingPunct="1">
+      <a:lvl2pPr marL="1485930" indent="-571511" algn="l" defTabSz="914418" rtl="0" eaLnBrk="1" latinLnBrk="0" hangingPunct="1">
         <a:spcBef>
           <a:spcPct val="20000"/>
         </a:spcBef>
         <a:buFont typeface="Arial"/>
         <a:buChar char="–"/>
-        <a:defRPr sz="2800" kern="1200">
+        <a:defRPr sz="5600" kern="1200">
           <a:solidFill>
             <a:schemeClr val="tx1"/>
           </a:solidFill>
@@ -3561,13 +3549,13 @@
           <a:cs typeface="+mn-cs"/>
         </a:defRPr>
       </a:lvl2pPr>
-      <a:lvl3pPr marL="1143000" indent="-228600" algn="l" defTabSz="457200" rtl="0" eaLnBrk="1" latinLnBrk="0" hangingPunct="1">
+      <a:lvl3pPr marL="2286046" indent="-457209" algn="l" defTabSz="914418" rtl="0" eaLnBrk="1" latinLnBrk="0" hangingPunct="1">
         <a:spcBef>
           <a:spcPct val="20000"/>
         </a:spcBef>
         <a:buFont typeface="Arial"/>
         <a:buChar char="•"/>
-        <a:defRPr sz="2400" kern="1200">
+        <a:defRPr sz="4800" kern="1200">
           <a:solidFill>
             <a:schemeClr val="tx1"/>
           </a:solidFill>
@@ -3576,13 +3564,13 @@
           <a:cs typeface="+mn-cs"/>
         </a:defRPr>
       </a:lvl3pPr>
-      <a:lvl4pPr marL="1600200" indent="-228600" algn="l" defTabSz="457200" rtl="0" eaLnBrk="1" latinLnBrk="0" hangingPunct="1">
+      <a:lvl4pPr marL="3200464" indent="-457209" algn="l" defTabSz="914418" rtl="0" eaLnBrk="1" latinLnBrk="0" hangingPunct="1">
         <a:spcBef>
           <a:spcPct val="20000"/>
         </a:spcBef>
         <a:buFont typeface="Arial"/>
         <a:buChar char="–"/>
-        <a:defRPr sz="2000" kern="1200">
+        <a:defRPr sz="4000" kern="1200">
           <a:solidFill>
             <a:schemeClr val="tx1"/>
           </a:solidFill>
@@ -3591,13 +3579,13 @@
           <a:cs typeface="+mn-cs"/>
         </a:defRPr>
       </a:lvl4pPr>
-      <a:lvl5pPr marL="2057400" indent="-228600" algn="l" defTabSz="457200" rtl="0" eaLnBrk="1" latinLnBrk="0" hangingPunct="1">
+      <a:lvl5pPr marL="4114882" indent="-457209" algn="l" defTabSz="914418" rtl="0" eaLnBrk="1" latinLnBrk="0" hangingPunct="1">
         <a:spcBef>
           <a:spcPct val="20000"/>
         </a:spcBef>
         <a:buFont typeface="Arial"/>
         <a:buChar char="»"/>
-        <a:defRPr sz="2000" kern="1200">
+        <a:defRPr sz="4000" kern="1200">
           <a:solidFill>
             <a:schemeClr val="tx1"/>
           </a:solidFill>
@@ -3606,13 +3594,13 @@
           <a:cs typeface="+mn-cs"/>
         </a:defRPr>
       </a:lvl5pPr>
-      <a:lvl6pPr marL="2514600" indent="-228600" algn="l" defTabSz="457200" rtl="0" eaLnBrk="1" latinLnBrk="0" hangingPunct="1">
+      <a:lvl6pPr marL="5029301" indent="-457209" algn="l" defTabSz="914418" rtl="0" eaLnBrk="1" latinLnBrk="0" hangingPunct="1">
         <a:spcBef>
           <a:spcPct val="20000"/>
         </a:spcBef>
         <a:buFont typeface="Arial"/>
         <a:buChar char="•"/>
-        <a:defRPr sz="2000" kern="1200">
+        <a:defRPr sz="4000" kern="1200">
           <a:solidFill>
             <a:schemeClr val="tx1"/>
           </a:solidFill>
@@ -3621,13 +3609,13 @@
           <a:cs typeface="+mn-cs"/>
         </a:defRPr>
       </a:lvl6pPr>
-      <a:lvl7pPr marL="2971800" indent="-228600" algn="l" defTabSz="457200" rtl="0" eaLnBrk="1" latinLnBrk="0" hangingPunct="1">
+      <a:lvl7pPr marL="5943719" indent="-457209" algn="l" defTabSz="914418" rtl="0" eaLnBrk="1" latinLnBrk="0" hangingPunct="1">
         <a:spcBef>
           <a:spcPct val="20000"/>
         </a:spcBef>
         <a:buFont typeface="Arial"/>
         <a:buChar char="•"/>
-        <a:defRPr sz="2000" kern="1200">
+        <a:defRPr sz="4000" kern="1200">
           <a:solidFill>
             <a:schemeClr val="tx1"/>
           </a:solidFill>
@@ -3636,13 +3624,13 @@
           <a:cs typeface="+mn-cs"/>
         </a:defRPr>
       </a:lvl7pPr>
-      <a:lvl8pPr marL="3429000" indent="-228600" algn="l" defTabSz="457200" rtl="0" eaLnBrk="1" latinLnBrk="0" hangingPunct="1">
+      <a:lvl8pPr marL="6858137" indent="-457209" algn="l" defTabSz="914418" rtl="0" eaLnBrk="1" latinLnBrk="0" hangingPunct="1">
         <a:spcBef>
           <a:spcPct val="20000"/>
         </a:spcBef>
         <a:buFont typeface="Arial"/>
         <a:buChar char="•"/>
-        <a:defRPr sz="2000" kern="1200">
+        <a:defRPr sz="4000" kern="1200">
           <a:solidFill>
             <a:schemeClr val="tx1"/>
           </a:solidFill>
@@ -3651,13 +3639,13 @@
           <a:cs typeface="+mn-cs"/>
         </a:defRPr>
       </a:lvl8pPr>
-      <a:lvl9pPr marL="3886200" indent="-228600" algn="l" defTabSz="457200" rtl="0" eaLnBrk="1" latinLnBrk="0" hangingPunct="1">
+      <a:lvl9pPr marL="7772555" indent="-457209" algn="l" defTabSz="914418" rtl="0" eaLnBrk="1" latinLnBrk="0" hangingPunct="1">
         <a:spcBef>
           <a:spcPct val="20000"/>
         </a:spcBef>
         <a:buFont typeface="Arial"/>
         <a:buChar char="•"/>
-        <a:defRPr sz="2000" kern="1200">
+        <a:defRPr sz="4000" kern="1200">
           <a:solidFill>
             <a:schemeClr val="tx1"/>
           </a:solidFill>
@@ -3671,8 +3659,8 @@
       <a:defPPr>
         <a:defRPr lang="en-US"/>
       </a:defPPr>
-      <a:lvl1pPr marL="0" algn="l" defTabSz="457200" rtl="0" eaLnBrk="1" latinLnBrk="0" hangingPunct="1">
-        <a:defRPr sz="1800" kern="1200">
+      <a:lvl1pPr marL="0" algn="l" defTabSz="914418" rtl="0" eaLnBrk="1" latinLnBrk="0" hangingPunct="1">
+        <a:defRPr sz="3600" kern="1200">
           <a:solidFill>
             <a:schemeClr val="tx1"/>
           </a:solidFill>
@@ -3681,8 +3669,8 @@
           <a:cs typeface="+mn-cs"/>
         </a:defRPr>
       </a:lvl1pPr>
-      <a:lvl2pPr marL="457200" algn="l" defTabSz="457200" rtl="0" eaLnBrk="1" latinLnBrk="0" hangingPunct="1">
-        <a:defRPr sz="1800" kern="1200">
+      <a:lvl2pPr marL="914418" algn="l" defTabSz="914418" rtl="0" eaLnBrk="1" latinLnBrk="0" hangingPunct="1">
+        <a:defRPr sz="3600" kern="1200">
           <a:solidFill>
             <a:schemeClr val="tx1"/>
           </a:solidFill>
@@ -3691,8 +3679,8 @@
           <a:cs typeface="+mn-cs"/>
         </a:defRPr>
       </a:lvl2pPr>
-      <a:lvl3pPr marL="914400" algn="l" defTabSz="457200" rtl="0" eaLnBrk="1" latinLnBrk="0" hangingPunct="1">
-        <a:defRPr sz="1800" kern="1200">
+      <a:lvl3pPr marL="1828837" algn="l" defTabSz="914418" rtl="0" eaLnBrk="1" latinLnBrk="0" hangingPunct="1">
+        <a:defRPr sz="3600" kern="1200">
           <a:solidFill>
             <a:schemeClr val="tx1"/>
           </a:solidFill>
@@ -3701,8 +3689,8 @@
           <a:cs typeface="+mn-cs"/>
         </a:defRPr>
       </a:lvl3pPr>
-      <a:lvl4pPr marL="1371600" algn="l" defTabSz="457200" rtl="0" eaLnBrk="1" latinLnBrk="0" hangingPunct="1">
-        <a:defRPr sz="1800" kern="1200">
+      <a:lvl4pPr marL="2743255" algn="l" defTabSz="914418" rtl="0" eaLnBrk="1" latinLnBrk="0" hangingPunct="1">
+        <a:defRPr sz="3600" kern="1200">
           <a:solidFill>
             <a:schemeClr val="tx1"/>
           </a:solidFill>
@@ -3711,8 +3699,8 @@
           <a:cs typeface="+mn-cs"/>
         </a:defRPr>
       </a:lvl4pPr>
-      <a:lvl5pPr marL="1828800" algn="l" defTabSz="457200" rtl="0" eaLnBrk="1" latinLnBrk="0" hangingPunct="1">
-        <a:defRPr sz="1800" kern="1200">
+      <a:lvl5pPr marL="3657673" algn="l" defTabSz="914418" rtl="0" eaLnBrk="1" latinLnBrk="0" hangingPunct="1">
+        <a:defRPr sz="3600" kern="1200">
           <a:solidFill>
             <a:schemeClr val="tx1"/>
           </a:solidFill>
@@ -3721,8 +3709,8 @@
           <a:cs typeface="+mn-cs"/>
         </a:defRPr>
       </a:lvl5pPr>
-      <a:lvl6pPr marL="2286000" algn="l" defTabSz="457200" rtl="0" eaLnBrk="1" latinLnBrk="0" hangingPunct="1">
-        <a:defRPr sz="1800" kern="1200">
+      <a:lvl6pPr marL="4572091" algn="l" defTabSz="914418" rtl="0" eaLnBrk="1" latinLnBrk="0" hangingPunct="1">
+        <a:defRPr sz="3600" kern="1200">
           <a:solidFill>
             <a:schemeClr val="tx1"/>
           </a:solidFill>
@@ -3731,8 +3719,8 @@
           <a:cs typeface="+mn-cs"/>
         </a:defRPr>
       </a:lvl6pPr>
-      <a:lvl7pPr marL="2743200" algn="l" defTabSz="457200" rtl="0" eaLnBrk="1" latinLnBrk="0" hangingPunct="1">
-        <a:defRPr sz="1800" kern="1200">
+      <a:lvl7pPr marL="5486510" algn="l" defTabSz="914418" rtl="0" eaLnBrk="1" latinLnBrk="0" hangingPunct="1">
+        <a:defRPr sz="3600" kern="1200">
           <a:solidFill>
             <a:schemeClr val="tx1"/>
           </a:solidFill>
@@ -3741,8 +3729,8 @@
           <a:cs typeface="+mn-cs"/>
         </a:defRPr>
       </a:lvl7pPr>
-      <a:lvl8pPr marL="3200400" algn="l" defTabSz="457200" rtl="0" eaLnBrk="1" latinLnBrk="0" hangingPunct="1">
-        <a:defRPr sz="1800" kern="1200">
+      <a:lvl8pPr marL="6400928" algn="l" defTabSz="914418" rtl="0" eaLnBrk="1" latinLnBrk="0" hangingPunct="1">
+        <a:defRPr sz="3600" kern="1200">
           <a:solidFill>
             <a:schemeClr val="tx1"/>
           </a:solidFill>
@@ -3751,8 +3739,8 @@
           <a:cs typeface="+mn-cs"/>
         </a:defRPr>
       </a:lvl8pPr>
-      <a:lvl9pPr marL="3657600" algn="l" defTabSz="457200" rtl="0" eaLnBrk="1" latinLnBrk="0" hangingPunct="1">
-        <a:defRPr sz="1800" kern="1200">
+      <a:lvl9pPr marL="7315346" algn="l" defTabSz="914418" rtl="0" eaLnBrk="1" latinLnBrk="0" hangingPunct="1">
+        <a:defRPr sz="3600" kern="1200">
           <a:solidFill>
             <a:schemeClr val="tx1"/>
           </a:solidFill>
@@ -3795,8 +3783,8 @@
         </p:nvSpPr>
         <p:spPr>
           <a:xfrm>
-            <a:off x="457200" y="2467058"/>
-            <a:ext cx="8229600" cy="1677151"/>
+            <a:off x="914400" y="7220118"/>
+            <a:ext cx="16459200" cy="3354301"/>
           </a:xfrm>
         </p:spPr>
         <p:txBody>
@@ -3815,13 +3803,8 @@
             </a:r>
             <a:r>
               <a:rPr lang="en-US" dirty="0"/>
-              <a:t> </a:t>
-            </a:r>
-            <a:r>
-              <a:rPr lang="en-US" dirty="0" smtClean="0"/>
-              <a:t>2</a:t>
-            </a:r>
-            <a:endParaRPr lang="en-US" dirty="0"/>
+              <a:t> 2</a:t>
+            </a:r>
           </a:p>
         </p:txBody>
       </p:sp>
@@ -3850,13 +3833,8 @@
             </a:r>
             <a:r>
               <a:rPr lang="en-US" dirty="0"/>
-              <a:t> </a:t>
-            </a:r>
-            <a:r>
-              <a:rPr lang="en-US" dirty="0" smtClean="0"/>
-              <a:t>2</a:t>
-            </a:r>
-            <a:endParaRPr lang="en-US" dirty="0"/>
+              <a:t> 2</a:t>
+            </a:r>
           </a:p>
         </p:txBody>
       </p:sp>
@@ -3925,8 +3903,8 @@
         </p:nvSpPr>
         <p:spPr>
           <a:xfrm>
-            <a:off x="457200" y="274637"/>
-            <a:ext cx="8229600" cy="1222625"/>
+            <a:off x="914400" y="2835276"/>
+            <a:ext cx="16459200" cy="2445250"/>
           </a:xfrm>
         </p:spPr>
         <p:txBody>
@@ -4017,14 +3995,13 @@
               <a:t>Step-By-Step Instructions for </a:t>
             </a:r>
             <a:r>
-              <a:rPr lang="en-US" dirty="0" err="1" smtClean="0"/>
+              <a:rPr lang="en-US" dirty="0" err="1"/>
               <a:t>Miniproject</a:t>
             </a:r>
             <a:r>
-              <a:rPr lang="en-US" dirty="0" smtClean="0"/>
+              <a:rPr lang="en-US" dirty="0"/>
               <a:t> 2</a:t>
             </a:r>
-            <a:endParaRPr lang="en-US" dirty="0"/>
           </a:p>
         </p:txBody>
       </p:sp>
@@ -4066,14 +4043,14 @@
           </p:nvPr>
         </p:nvGraphicFramePr>
         <p:xfrm>
-          <a:off x="5069553" y="3111816"/>
-          <a:ext cx="2022081" cy="634378"/>
+          <a:off x="10139108" y="8509633"/>
+          <a:ext cx="4044161" cy="1268756"/>
         </p:xfrm>
         <a:graphic>
           <a:graphicData uri="http://schemas.openxmlformats.org/presentationml/2006/ole">
             <mc:AlternateContent xmlns:mc="http://schemas.openxmlformats.org/markup-compatibility/2006">
               <mc:Choice xmlns:v="urn:schemas-microsoft-com:vml" Requires="v">
-                <p:oleObj spid="_x0000_s88169" name="Equation" r:id="rId3" imgW="647700" imgH="203200" progId="Equation.3">
+                <p:oleObj spid="_x0000_s88174" name="Equation" r:id="rId3" imgW="647700" imgH="203200" progId="Equation.3">
                   <p:embed/>
                 </p:oleObj>
               </mc:Choice>
@@ -4094,8 +4071,8 @@
                     </p:blipFill>
                     <p:spPr>
                       <a:xfrm>
-                        <a:off x="5069553" y="3111816"/>
-                        <a:ext cx="2022081" cy="634378"/>
+                        <a:off x="10139108" y="8509633"/>
+                        <a:ext cx="4044161" cy="1268756"/>
                       </a:xfrm>
                       <a:prstGeom prst="rect">
                         <a:avLst/>
@@ -4116,8 +4093,8 @@
         </p:nvSpPr>
         <p:spPr>
           <a:xfrm>
-            <a:off x="7141962" y="4072752"/>
-            <a:ext cx="1253506" cy="369332"/>
+            <a:off x="14283924" y="10431504"/>
+            <a:ext cx="3176254" cy="867930"/>
           </a:xfrm>
           <a:prstGeom prst="rect">
             <a:avLst/>
@@ -4131,7 +4108,7 @@
           <a:lstStyle/>
           <a:p>
             <a:r>
-              <a:rPr lang="en-US" dirty="0">
+              <a:rPr lang="en-US" sz="5040" dirty="0">
                 <a:solidFill>
                   <a:srgbClr val="800000"/>
                 </a:solidFill>
@@ -4149,8 +4126,8 @@
         </p:nvCxnSpPr>
         <p:spPr>
           <a:xfrm flipH="1" flipV="1">
-            <a:off x="6756983" y="3665983"/>
-            <a:ext cx="384979" cy="511224"/>
+            <a:off x="13513968" y="9617966"/>
+            <a:ext cx="769959" cy="1022449"/>
           </a:xfrm>
           <a:prstGeom prst="straightConnector1">
             <a:avLst/>
@@ -4189,8 +4166,8 @@
         </p:nvSpPr>
         <p:spPr>
           <a:xfrm>
-            <a:off x="5128678" y="4114745"/>
-            <a:ext cx="1253506" cy="369332"/>
+            <a:off x="10257356" y="10515491"/>
+            <a:ext cx="3176254" cy="867930"/>
           </a:xfrm>
           <a:prstGeom prst="rect">
             <a:avLst/>
@@ -4204,7 +4181,7 @@
           <a:lstStyle/>
           <a:p>
             <a:r>
-              <a:rPr lang="en-US" dirty="0">
+              <a:rPr lang="en-US" sz="5040" dirty="0">
                 <a:solidFill>
                   <a:srgbClr val="800000"/>
                 </a:solidFill>
@@ -4224,8 +4201,8 @@
         </p:nvCxnSpPr>
         <p:spPr>
           <a:xfrm flipV="1">
-            <a:off x="5755431" y="3665983"/>
-            <a:ext cx="232867" cy="448762"/>
+            <a:off x="11845483" y="9617970"/>
+            <a:ext cx="131115" cy="897521"/>
           </a:xfrm>
           <a:prstGeom prst="straightConnector1">
             <a:avLst/>
@@ -4264,8 +4241,8 @@
         </p:nvCxnSpPr>
         <p:spPr>
           <a:xfrm flipH="1" flipV="1">
-            <a:off x="6458868" y="3665983"/>
-            <a:ext cx="298115" cy="818094"/>
+            <a:off x="12917738" y="9617966"/>
+            <a:ext cx="596230" cy="1636189"/>
           </a:xfrm>
           <a:prstGeom prst="straightConnector1">
             <a:avLst/>
@@ -4304,8 +4281,8 @@
         </p:nvSpPr>
         <p:spPr>
           <a:xfrm>
-            <a:off x="6222375" y="4484077"/>
-            <a:ext cx="1005428" cy="369332"/>
+            <a:off x="12444752" y="11254154"/>
+            <a:ext cx="2480551" cy="867930"/>
           </a:xfrm>
           <a:prstGeom prst="rect">
             <a:avLst/>
@@ -4319,7 +4296,7 @@
           <a:lstStyle/>
           <a:p>
             <a:r>
-              <a:rPr lang="en-US" dirty="0">
+              <a:rPr lang="en-US" sz="5040" dirty="0">
                 <a:solidFill>
                   <a:srgbClr val="800000"/>
                 </a:solidFill>
@@ -4372,7 +4349,7 @@
         <p:spPr/>
         <p:txBody>
           <a:bodyPr>
-            <a:normAutofit fontScale="90000"/>
+            <a:normAutofit/>
           </a:bodyPr>
           <a:lstStyle/>
           <a:p>
@@ -4440,7 +4417,7 @@
           </a:p>
           <a:p>
             <a:pPr lvl="1"/>
-            <a:endParaRPr lang="en-US" sz="1600" baseline="-25000" dirty="0"/>
+            <a:endParaRPr lang="en-US" sz="3200" baseline="-25000" dirty="0"/>
           </a:p>
           <a:p>
             <a:pPr lvl="1"/>
@@ -4471,14 +4448,13 @@
               <a:t>Step-By-Step Instructions for </a:t>
             </a:r>
             <a:r>
-              <a:rPr lang="en-US" dirty="0" err="1" smtClean="0"/>
+              <a:rPr lang="en-US" dirty="0" err="1"/>
               <a:t>Miniproject</a:t>
             </a:r>
             <a:r>
-              <a:rPr lang="en-US" dirty="0" smtClean="0"/>
+              <a:rPr lang="en-US" dirty="0"/>
               <a:t> 2</a:t>
             </a:r>
-            <a:endParaRPr lang="en-US" dirty="0"/>
           </a:p>
         </p:txBody>
       </p:sp>
@@ -4520,14 +4496,14 @@
           </p:nvPr>
         </p:nvGraphicFramePr>
         <p:xfrm>
-          <a:off x="1040231" y="2919564"/>
-          <a:ext cx="3449637" cy="754062"/>
+          <a:off x="2080463" y="8125129"/>
+          <a:ext cx="6899274" cy="1508124"/>
         </p:xfrm>
         <a:graphic>
           <a:graphicData uri="http://schemas.openxmlformats.org/presentationml/2006/ole">
             <mc:AlternateContent xmlns:mc="http://schemas.openxmlformats.org/markup-compatibility/2006">
               <mc:Choice xmlns:v="urn:schemas-microsoft-com:vml" Requires="v">
-                <p:oleObj spid="_x0000_s89277" name="Equation" r:id="rId3" imgW="1104900" imgH="241300" progId="Equation.3">
+                <p:oleObj spid="_x0000_s89287" name="Equation" r:id="rId3" imgW="1104900" imgH="241300" progId="Equation.3">
                   <p:embed/>
                 </p:oleObj>
               </mc:Choice>
@@ -4548,8 +4524,8 @@
                     </p:blipFill>
                     <p:spPr>
                       <a:xfrm>
-                        <a:off x="1040231" y="2919564"/>
-                        <a:ext cx="3449637" cy="754062"/>
+                        <a:off x="2080463" y="8125129"/>
+                        <a:ext cx="6899274" cy="1508124"/>
                       </a:xfrm>
                       <a:prstGeom prst="rect">
                         <a:avLst/>
@@ -4577,14 +4553,14 @@
           </p:nvPr>
         </p:nvGraphicFramePr>
         <p:xfrm>
-          <a:off x="1000543" y="3873735"/>
-          <a:ext cx="3530600" cy="754062"/>
+          <a:off x="2001086" y="10033471"/>
+          <a:ext cx="7061200" cy="1508124"/>
         </p:xfrm>
         <a:graphic>
           <a:graphicData uri="http://schemas.openxmlformats.org/presentationml/2006/ole">
             <mc:AlternateContent xmlns:mc="http://schemas.openxmlformats.org/markup-compatibility/2006">
               <mc:Choice xmlns:v="urn:schemas-microsoft-com:vml" Requires="v">
-                <p:oleObj spid="_x0000_s89278" name="Equation" r:id="rId5" imgW="1130300" imgH="241300" progId="Equation.3">
+                <p:oleObj spid="_x0000_s89288" name="Equation" r:id="rId5" imgW="1130300" imgH="241300" progId="Equation.3">
                   <p:embed/>
                 </p:oleObj>
               </mc:Choice>
@@ -4605,8 +4581,8 @@
                     </p:blipFill>
                     <p:spPr>
                       <a:xfrm>
-                        <a:off x="1000543" y="3873735"/>
-                        <a:ext cx="3530600" cy="754062"/>
+                        <a:off x="2001086" y="10033471"/>
+                        <a:ext cx="7061200" cy="1508124"/>
                       </a:xfrm>
                       <a:prstGeom prst="rect">
                         <a:avLst/>
@@ -4627,8 +4603,8 @@
         </p:nvSpPr>
         <p:spPr>
           <a:xfrm>
-            <a:off x="4948098" y="3868426"/>
-            <a:ext cx="3355794" cy="646331"/>
+            <a:off x="9896197" y="10022853"/>
+            <a:ext cx="9128589" cy="1643527"/>
           </a:xfrm>
           <a:prstGeom prst="rect">
             <a:avLst/>
@@ -4642,7 +4618,7 @@
           <a:lstStyle/>
           <a:p>
             <a:r>
-              <a:rPr lang="en-US" dirty="0">
+              <a:rPr lang="en-US" sz="5040" dirty="0">
                 <a:solidFill>
                   <a:srgbClr val="800000"/>
                 </a:solidFill>
@@ -4652,7 +4628,7 @@
           </a:p>
           <a:p>
             <a:r>
-              <a:rPr lang="en-US" dirty="0">
+              <a:rPr lang="en-US" sz="5040" dirty="0">
                 <a:solidFill>
                   <a:srgbClr val="800000"/>
                 </a:solidFill>
@@ -4704,8 +4680,8 @@
         </p:nvSpPr>
         <p:spPr>
           <a:xfrm>
-            <a:off x="457200" y="274637"/>
-            <a:ext cx="8229600" cy="1222625"/>
+            <a:off x="914400" y="2835276"/>
+            <a:ext cx="16459200" cy="2445250"/>
           </a:xfrm>
         </p:spPr>
         <p:txBody>
@@ -4754,7 +4730,7 @@
           </a:p>
           <a:p>
             <a:pPr lvl="1"/>
-            <a:endParaRPr lang="en-US" sz="1600" dirty="0"/>
+            <a:endParaRPr lang="en-US" sz="3200" dirty="0"/>
           </a:p>
           <a:p>
             <a:pPr lvl="1"/>
@@ -4819,14 +4795,13 @@
               <a:t>Step-By-Step Instructions for </a:t>
             </a:r>
             <a:r>
-              <a:rPr lang="en-US" dirty="0" err="1" smtClean="0"/>
+              <a:rPr lang="en-US" dirty="0" err="1"/>
               <a:t>Miniproject</a:t>
             </a:r>
             <a:r>
-              <a:rPr lang="en-US" dirty="0" smtClean="0"/>
+              <a:rPr lang="en-US" dirty="0"/>
               <a:t> 2</a:t>
             </a:r>
-            <a:endParaRPr lang="en-US" dirty="0"/>
           </a:p>
         </p:txBody>
       </p:sp>
@@ -4868,14 +4843,14 @@
           </p:nvPr>
         </p:nvGraphicFramePr>
         <p:xfrm>
-          <a:off x="4336753" y="2253604"/>
-          <a:ext cx="2216448" cy="484497"/>
+          <a:off x="8673506" y="6793209"/>
+          <a:ext cx="4432896" cy="968994"/>
         </p:xfrm>
         <a:graphic>
           <a:graphicData uri="http://schemas.openxmlformats.org/presentationml/2006/ole">
             <mc:AlternateContent xmlns:mc="http://schemas.openxmlformats.org/markup-compatibility/2006">
               <mc:Choice xmlns:v="urn:schemas-microsoft-com:vml" Requires="v">
-                <p:oleObj spid="_x0000_s90295" name="Equation" r:id="rId3" imgW="1104900" imgH="241300" progId="Equation.3">
+                <p:oleObj spid="_x0000_s90305" name="Equation" r:id="rId3" imgW="1104900" imgH="241300" progId="Equation.3">
                   <p:embed/>
                 </p:oleObj>
               </mc:Choice>
@@ -4896,8 +4871,8 @@
                     </p:blipFill>
                     <p:spPr>
                       <a:xfrm>
-                        <a:off x="4336753" y="2253604"/>
-                        <a:ext cx="2216448" cy="484497"/>
+                        <a:off x="8673506" y="6793209"/>
+                        <a:ext cx="4432896" cy="968994"/>
                       </a:xfrm>
                       <a:prstGeom prst="rect">
                         <a:avLst/>
@@ -4925,14 +4900,14 @@
           </p:nvPr>
         </p:nvGraphicFramePr>
         <p:xfrm>
-          <a:off x="4357316" y="2967144"/>
-          <a:ext cx="2268468" cy="484497"/>
+          <a:off x="8714633" y="8220289"/>
+          <a:ext cx="4536936" cy="968994"/>
         </p:xfrm>
         <a:graphic>
           <a:graphicData uri="http://schemas.openxmlformats.org/presentationml/2006/ole">
             <mc:AlternateContent xmlns:mc="http://schemas.openxmlformats.org/markup-compatibility/2006">
               <mc:Choice xmlns:v="urn:schemas-microsoft-com:vml" Requires="v">
-                <p:oleObj spid="_x0000_s90296" name="Equation" r:id="rId5" imgW="1130300" imgH="241300" progId="Equation.3">
+                <p:oleObj spid="_x0000_s90306" name="Equation" r:id="rId5" imgW="1130300" imgH="241300" progId="Equation.3">
                   <p:embed/>
                 </p:oleObj>
               </mc:Choice>
@@ -4953,8 +4928,8 @@
                     </p:blipFill>
                     <p:spPr>
                       <a:xfrm>
-                        <a:off x="4357316" y="2967144"/>
-                        <a:ext cx="2268468" cy="484497"/>
+                        <a:off x="8714633" y="8220289"/>
+                        <a:ext cx="4536936" cy="968994"/>
                       </a:xfrm>
                       <a:prstGeom prst="rect">
                         <a:avLst/>
@@ -4983,8 +4958,8 @@
         </p:blipFill>
         <p:spPr>
           <a:xfrm>
-            <a:off x="2635916" y="4971177"/>
-            <a:ext cx="4188897" cy="1154986"/>
+            <a:off x="5271833" y="12228355"/>
+            <a:ext cx="8377794" cy="2309971"/>
           </a:xfrm>
           <a:prstGeom prst="rect">
             <a:avLst/>
@@ -5061,76 +5036,68 @@
           <a:lstStyle/>
           <a:p>
             <a:r>
-              <a:rPr lang="en-US" sz="2400" dirty="0"/>
-              <a:t>The top D dimensions of matrix A </a:t>
-            </a:r>
-            <a:r>
-              <a:rPr lang="en-US" sz="2400" dirty="0" smtClean="0"/>
-              <a:t>define a </a:t>
-            </a:r>
-            <a:r>
-              <a:rPr lang="en-US" sz="2400" dirty="0"/>
-              <a:t>D-dim projection that best preserves the learned movie features V:</a:t>
+              <a:rPr lang="en-US" sz="4800" dirty="0"/>
+              <a:t>The top D dimensions of matrix A define a D-dim projection that best preserves the learned movie features V:</a:t>
             </a:r>
           </a:p>
           <a:p>
             <a:pPr marL="0" indent="0">
               <a:buNone/>
             </a:pPr>
-            <a:endParaRPr lang="en-US" sz="2000" dirty="0"/>
+            <a:endParaRPr lang="en-US" sz="4000" dirty="0"/>
           </a:p>
           <a:p>
             <a:pPr marL="0" indent="0">
               <a:buNone/>
             </a:pPr>
-            <a:endParaRPr lang="en-US" sz="2000" dirty="0"/>
+            <a:endParaRPr lang="en-US" sz="4000" dirty="0"/>
           </a:p>
           <a:p>
             <a:pPr marL="0" indent="0">
               <a:buNone/>
             </a:pPr>
-            <a:endParaRPr lang="en-US" sz="2000" dirty="0"/>
+            <a:endParaRPr lang="en-US" sz="4000" dirty="0"/>
           </a:p>
           <a:p>
             <a:pPr marL="0" indent="0">
               <a:buNone/>
             </a:pPr>
+            <a:endParaRPr lang="en-US" sz="4000" dirty="0"/>
+          </a:p>
+          <a:p>
+            <a:r>
+              <a:rPr lang="en-US" sz="4800" dirty="0"/>
+              <a:t>We want 2-dimensional projection for visualization purposes</a:t>
+            </a:r>
+          </a:p>
+          <a:p>
+            <a:pPr lvl="1"/>
+            <a:r>
+              <a:rPr lang="en-US" sz="4000" dirty="0"/>
+              <a:t>So we take top 2 dimensions of SVD</a:t>
+            </a:r>
+          </a:p>
+          <a:p>
+            <a:pPr lvl="1"/>
             <a:endParaRPr lang="en-US" sz="2000" dirty="0"/>
           </a:p>
           <a:p>
             <a:r>
-              <a:rPr lang="en-US" sz="2400" dirty="0"/>
-              <a:t>We want 2-dimensional projection for visualization purposes</a:t>
+              <a:rPr lang="en-US" sz="4800" dirty="0"/>
+              <a:t>Now we can visualize movies in 2D plot</a:t>
             </a:r>
           </a:p>
           <a:p>
             <a:pPr lvl="1"/>
             <a:r>
-              <a:rPr lang="en-US" sz="2000" dirty="0"/>
-              <a:t>So we take top 2 dimensions of SVD</a:t>
+              <a:rPr lang="en-US" sz="4000" dirty="0"/>
+              <a:t>And see if close-by movies have similarities</a:t>
             </a:r>
           </a:p>
           <a:p>
             <a:pPr lvl="1"/>
-            <a:endParaRPr lang="en-US" sz="1000" dirty="0"/>
-          </a:p>
-          <a:p>
-            <a:r>
-              <a:rPr lang="en-US" sz="2400" dirty="0"/>
-              <a:t>Now we can visualize movies in 2D plot</a:t>
-            </a:r>
-          </a:p>
-          <a:p>
-            <a:pPr lvl="1"/>
-            <a:r>
-              <a:rPr lang="en-US" sz="2000" dirty="0"/>
-              <a:t>And see if close-by movies have similarities</a:t>
-            </a:r>
-          </a:p>
-          <a:p>
-            <a:pPr lvl="1"/>
-            <a:r>
-              <a:rPr lang="en-US" sz="2000" dirty="0"/>
+            <a:r>
+              <a:rPr lang="en-US" sz="4000" dirty="0"/>
               <a:t>E.g., horror, action, etc.</a:t>
             </a:r>
           </a:p>
@@ -5156,14 +5123,13 @@
               <a:t>Step-By-Step Instructions for </a:t>
             </a:r>
             <a:r>
-              <a:rPr lang="en-US" dirty="0" err="1" smtClean="0"/>
+              <a:rPr lang="en-US" dirty="0" err="1"/>
               <a:t>Miniproject</a:t>
             </a:r>
             <a:r>
-              <a:rPr lang="en-US" dirty="0" smtClean="0"/>
+              <a:rPr lang="en-US" dirty="0"/>
               <a:t> 2</a:t>
             </a:r>
-            <a:endParaRPr lang="en-US" dirty="0"/>
           </a:p>
         </p:txBody>
       </p:sp>
@@ -5205,14 +5171,14 @@
           </p:nvPr>
         </p:nvGraphicFramePr>
         <p:xfrm>
-          <a:off x="5950941" y="2635102"/>
-          <a:ext cx="1739900" cy="763587"/>
+          <a:off x="11901881" y="7556204"/>
+          <a:ext cx="3479800" cy="1527174"/>
         </p:xfrm>
         <a:graphic>
           <a:graphicData uri="http://schemas.openxmlformats.org/presentationml/2006/ole">
             <mc:AlternateContent xmlns:mc="http://schemas.openxmlformats.org/markup-compatibility/2006">
               <mc:Choice xmlns:v="urn:schemas-microsoft-com:vml" Requires="v">
-                <p:oleObj spid="_x0000_s93259" name="Equation" r:id="rId3" imgW="952500" imgH="419100" progId="Equation.3">
+                <p:oleObj spid="_x0000_s93269" name="Equation" r:id="rId3" imgW="952500" imgH="419100" progId="Equation.3">
                   <p:embed/>
                 </p:oleObj>
               </mc:Choice>
@@ -5233,8 +5199,8 @@
                     </p:blipFill>
                     <p:spPr>
                       <a:xfrm>
-                        <a:off x="5950941" y="2635102"/>
-                        <a:ext cx="1739900" cy="763587"/>
+                        <a:off x="11901881" y="7556204"/>
+                        <a:ext cx="3479800" cy="1527174"/>
                       </a:xfrm>
                       <a:prstGeom prst="rect">
                         <a:avLst/>
@@ -5262,14 +5228,14 @@
           </p:nvPr>
         </p:nvGraphicFramePr>
         <p:xfrm>
-          <a:off x="1497710" y="2718234"/>
-          <a:ext cx="1306513" cy="522287"/>
+          <a:off x="2995421" y="7722469"/>
+          <a:ext cx="2613026" cy="1044574"/>
         </p:xfrm>
         <a:graphic>
           <a:graphicData uri="http://schemas.openxmlformats.org/presentationml/2006/ole">
             <mc:AlternateContent xmlns:mc="http://schemas.openxmlformats.org/markup-compatibility/2006">
               <mc:Choice xmlns:v="urn:schemas-microsoft-com:vml" Requires="v">
-                <p:oleObj spid="_x0000_s93260" name="Equation" r:id="rId5" imgW="635000" imgH="254000" progId="Equation.3">
+                <p:oleObj spid="_x0000_s93270" name="Equation" r:id="rId5" imgW="635000" imgH="254000" progId="Equation.3">
                   <p:embed/>
                 </p:oleObj>
               </mc:Choice>
@@ -5290,8 +5256,8 @@
                     </p:blipFill>
                     <p:spPr>
                       <a:xfrm>
-                        <a:off x="1497710" y="2718234"/>
-                        <a:ext cx="1306513" cy="522287"/>
+                        <a:off x="2995421" y="7722469"/>
+                        <a:ext cx="2613026" cy="1044574"/>
                       </a:xfrm>
                       <a:prstGeom prst="rect">
                         <a:avLst/>
@@ -5312,8 +5278,8 @@
         </p:nvSpPr>
         <p:spPr>
           <a:xfrm>
-            <a:off x="3296062" y="2635102"/>
-            <a:ext cx="2503243" cy="646331"/>
+            <a:off x="6592126" y="7556204"/>
+            <a:ext cx="5006486" cy="2419124"/>
           </a:xfrm>
           <a:prstGeom prst="rect">
             <a:avLst/>
@@ -5327,7 +5293,7 @@
           <a:lstStyle/>
           <a:p>
             <a:r>
-              <a:rPr lang="en-US" dirty="0"/>
+              <a:rPr lang="en-US" sz="5040" dirty="0"/>
               <a:t>Minimizes loss of feature representation:</a:t>
             </a:r>
           </a:p>
@@ -5341,8 +5307,8 @@
         </p:nvSpPr>
         <p:spPr>
           <a:xfrm>
-            <a:off x="895343" y="3357777"/>
-            <a:ext cx="2537286" cy="369332"/>
+            <a:off x="1790688" y="9001554"/>
+            <a:ext cx="6728317" cy="867930"/>
           </a:xfrm>
           <a:prstGeom prst="rect">
             <a:avLst/>
@@ -5356,7 +5322,7 @@
           <a:lstStyle/>
           <a:p>
             <a:r>
-              <a:rPr lang="en-US" dirty="0">
+              <a:rPr lang="en-US" sz="5040" dirty="0">
                 <a:solidFill>
                   <a:srgbClr val="953735"/>
                 </a:solidFill>
@@ -5374,8 +5340,8 @@
         </p:nvSpPr>
         <p:spPr>
           <a:xfrm>
-            <a:off x="5484552" y="3357777"/>
-            <a:ext cx="3082131" cy="369332"/>
+            <a:off x="10969106" y="9001554"/>
+            <a:ext cx="8286692" cy="867930"/>
           </a:xfrm>
           <a:prstGeom prst="rect">
             <a:avLst/>
@@ -5389,7 +5355,7 @@
           <a:lstStyle/>
           <a:p>
             <a:r>
-              <a:rPr lang="en-US" dirty="0">
+              <a:rPr lang="en-US" sz="5040" dirty="0">
                 <a:solidFill>
                   <a:srgbClr val="953735"/>
                 </a:solidFill>
@@ -5442,7 +5408,7 @@
         <p:spPr/>
         <p:txBody>
           <a:bodyPr>
-            <a:normAutofit fontScale="90000"/>
+            <a:normAutofit/>
           </a:bodyPr>
           <a:lstStyle/>
           <a:p>
@@ -5478,13 +5444,13 @@
           <a:p>
             <a:pPr lvl="1"/>
             <a:r>
-              <a:rPr lang="en-US" sz="2400" dirty="0"/>
+              <a:rPr lang="en-US" sz="4800" dirty="0"/>
               <a:t>Although the above method should always give you something reasonable to visualize</a:t>
             </a:r>
           </a:p>
           <a:p>
             <a:pPr lvl="1"/>
-            <a:endParaRPr lang="en-US" sz="2000" dirty="0"/>
+            <a:endParaRPr lang="en-US" sz="4000" dirty="0"/>
           </a:p>
           <a:p>
             <a:r>
@@ -5495,14 +5461,14 @@
           <a:p>
             <a:pPr lvl="1"/>
             <a:r>
-              <a:rPr lang="en-US" sz="2400" dirty="0"/>
+              <a:rPr lang="en-US" sz="4800" dirty="0"/>
               <a:t>Projection should preserves as much of the original features as possible</a:t>
             </a:r>
           </a:p>
           <a:p>
             <a:pPr lvl="1"/>
             <a:r>
-              <a:rPr lang="en-US" sz="2400" dirty="0"/>
+              <a:rPr lang="en-US" sz="4800" dirty="0"/>
               <a:t>A dot product in the 2-D representation should approximate the dot product in the K-D representation</a:t>
             </a:r>
           </a:p>
@@ -5528,14 +5494,13 @@
               <a:t>Step-By-Step Instructions for </a:t>
             </a:r>
             <a:r>
-              <a:rPr lang="en-US" dirty="0" err="1" smtClean="0"/>
+              <a:rPr lang="en-US" dirty="0" err="1"/>
               <a:t>Miniproject</a:t>
             </a:r>
             <a:r>
-              <a:rPr lang="en-US" dirty="0" smtClean="0"/>
+              <a:rPr lang="en-US" dirty="0"/>
               <a:t> 2</a:t>
             </a:r>
-            <a:endParaRPr lang="en-US" dirty="0"/>
           </a:p>
         </p:txBody>
       </p:sp>
@@ -5626,8 +5591,8 @@
         </p:nvSpPr>
         <p:spPr>
           <a:xfrm>
-            <a:off x="457200" y="1600200"/>
-            <a:ext cx="8229600" cy="4756150"/>
+            <a:off x="914400" y="5486400"/>
+            <a:ext cx="16459200" cy="9512300"/>
           </a:xfrm>
         </p:spPr>
         <p:txBody>
@@ -5644,60 +5609,60 @@
           <a:p>
             <a:pPr lvl="1"/>
             <a:r>
-              <a:rPr lang="en-US" sz="2000" dirty="0"/>
+              <a:rPr lang="en-US" sz="4000" dirty="0"/>
               <a:t>Pick a few movies and plot their projected 2D representation</a:t>
             </a:r>
           </a:p>
           <a:p>
             <a:pPr lvl="1"/>
             <a:r>
-              <a:rPr lang="en-US" sz="2000" dirty="0"/>
+              <a:rPr lang="en-US" sz="4000" dirty="0"/>
               <a:t>Verify that distances/angles/axes in your plot can be interpreted</a:t>
             </a:r>
+          </a:p>
+          <a:p>
+            <a:pPr lvl="1"/>
+            <a:endParaRPr lang="en-US" sz="4000" dirty="0"/>
+          </a:p>
+          <a:p>
+            <a:pPr lvl="1"/>
+            <a:endParaRPr lang="en-US" sz="4000" dirty="0"/>
+          </a:p>
+          <a:p>
+            <a:pPr lvl="1"/>
+            <a:endParaRPr lang="en-US" sz="4000" dirty="0"/>
+          </a:p>
+          <a:p>
+            <a:pPr lvl="1"/>
+            <a:endParaRPr lang="en-US" sz="4000" dirty="0"/>
+          </a:p>
+          <a:p>
+            <a:pPr marL="914418" lvl="1" indent="0">
+              <a:buNone/>
+            </a:pPr>
+            <a:endParaRPr lang="en-US" sz="4000" dirty="0"/>
           </a:p>
           <a:p>
             <a:pPr lvl="1"/>
             <a:endParaRPr lang="en-US" sz="2000" dirty="0"/>
           </a:p>
           <a:p>
+            <a:r>
+              <a:rPr lang="en-US" sz="5600" dirty="0"/>
+              <a:t>Can also plot the genres provided:</a:t>
+            </a:r>
+          </a:p>
+          <a:p>
             <a:pPr lvl="1"/>
-            <a:endParaRPr lang="en-US" sz="2000" dirty="0"/>
+            <a:r>
+              <a:rPr lang="en-US" sz="4000" dirty="0"/>
+              <a:t>E.g., where is the average horror movie?</a:t>
+            </a:r>
           </a:p>
           <a:p>
             <a:pPr lvl="1"/>
-            <a:endParaRPr lang="en-US" sz="2000" dirty="0"/>
-          </a:p>
-          <a:p>
-            <a:pPr lvl="1"/>
-            <a:endParaRPr lang="en-US" sz="2000" dirty="0"/>
-          </a:p>
-          <a:p>
-            <a:pPr marL="457200" lvl="1" indent="0">
-              <a:buNone/>
-            </a:pPr>
-            <a:endParaRPr lang="en-US" sz="2000" dirty="0"/>
-          </a:p>
-          <a:p>
-            <a:pPr lvl="1"/>
-            <a:endParaRPr lang="en-US" sz="1000" dirty="0"/>
-          </a:p>
-          <a:p>
-            <a:r>
-              <a:rPr lang="en-US" sz="2800" dirty="0"/>
-              <a:t>Can also plot the genres provided:</a:t>
-            </a:r>
-          </a:p>
-          <a:p>
-            <a:pPr lvl="1"/>
-            <a:r>
-              <a:rPr lang="en-US" sz="2000" dirty="0"/>
-              <a:t>E.g., where is the average horror movie?</a:t>
-            </a:r>
-          </a:p>
-          <a:p>
-            <a:pPr lvl="1"/>
-            <a:r>
-              <a:rPr lang="en-US" sz="2000" dirty="0"/>
+            <a:r>
+              <a:rPr lang="en-US" sz="4000" dirty="0"/>
               <a:t>E.g., compute the average v for all movies that belong to horror genre</a:t>
             </a:r>
           </a:p>
@@ -5723,14 +5688,13 @@
               <a:t>Step-By-Step Instructions for </a:t>
             </a:r>
             <a:r>
-              <a:rPr lang="en-US" dirty="0" err="1" smtClean="0"/>
+              <a:rPr lang="en-US" dirty="0" err="1"/>
               <a:t>Miniproject</a:t>
             </a:r>
             <a:r>
-              <a:rPr lang="en-US" dirty="0" smtClean="0"/>
+              <a:rPr lang="en-US" dirty="0"/>
               <a:t> 2</a:t>
             </a:r>
-            <a:endParaRPr lang="en-US" dirty="0"/>
           </a:p>
         </p:txBody>
       </p:sp>
@@ -5773,8 +5737,8 @@
         </p:blipFill>
         <p:spPr>
           <a:xfrm>
-            <a:off x="2714470" y="3017632"/>
-            <a:ext cx="2358087" cy="1751055"/>
+            <a:off x="5428942" y="8321266"/>
+            <a:ext cx="4716174" cy="3502110"/>
           </a:xfrm>
           <a:prstGeom prst="rect">
             <a:avLst/>
@@ -5789,8 +5753,8 @@
         </p:nvSpPr>
         <p:spPr>
           <a:xfrm>
-            <a:off x="1534246" y="3648302"/>
-            <a:ext cx="1043187" cy="369332"/>
+            <a:off x="3068493" y="9582604"/>
+            <a:ext cx="2579104" cy="867930"/>
           </a:xfrm>
           <a:prstGeom prst="rect">
             <a:avLst/>
@@ -5804,7 +5768,7 @@
           <a:lstStyle/>
           <a:p>
             <a:r>
-              <a:rPr lang="en-US" dirty="0"/>
+              <a:rPr lang="en-US" sz="5040" dirty="0"/>
               <a:t>Example:</a:t>
             </a:r>
           </a:p>
@@ -5818,8 +5782,8 @@
         </p:nvSpPr>
         <p:spPr>
           <a:xfrm>
-            <a:off x="5665410" y="3346186"/>
-            <a:ext cx="2482057" cy="923330"/>
+            <a:off x="11330820" y="8978373"/>
+            <a:ext cx="6757812" cy="2419124"/>
           </a:xfrm>
           <a:prstGeom prst="rect">
             <a:avLst/>
@@ -5833,7 +5797,7 @@
           <a:lstStyle/>
           <a:p>
             <a:r>
-              <a:rPr lang="en-US" dirty="0">
+              <a:rPr lang="en-US" sz="5040" dirty="0">
                 <a:solidFill>
                   <a:srgbClr val="953735"/>
                 </a:solidFill>
@@ -5843,7 +5807,7 @@
           </a:p>
           <a:p>
             <a:r>
-              <a:rPr lang="en-US" dirty="0">
+              <a:rPr lang="en-US" sz="5040" dirty="0">
                 <a:solidFill>
                   <a:srgbClr val="953735"/>
                 </a:solidFill>
@@ -5853,7 +5817,7 @@
           </a:p>
           <a:p>
             <a:r>
-              <a:rPr lang="en-US" dirty="0">
+              <a:rPr lang="en-US" sz="5040" dirty="0">
                 <a:solidFill>
                   <a:srgbClr val="953735"/>
                 </a:solidFill>
@@ -5915,8 +5879,8 @@
         </p:blipFill>
         <p:spPr>
           <a:xfrm>
-            <a:off x="2360840" y="1356627"/>
-            <a:ext cx="6398928" cy="4859079"/>
+            <a:off x="4721681" y="4999255"/>
+            <a:ext cx="12797856" cy="9718159"/>
           </a:xfrm>
           <a:prstGeom prst="rect">
             <a:avLst/>
@@ -5935,8 +5899,8 @@
         </p:nvSpPr>
         <p:spPr>
           <a:xfrm>
-            <a:off x="457200" y="274638"/>
-            <a:ext cx="8229600" cy="980963"/>
+            <a:off x="914400" y="2835277"/>
+            <a:ext cx="16459200" cy="1961926"/>
           </a:xfrm>
         </p:spPr>
         <p:txBody>
@@ -5972,14 +5936,13 @@
               <a:t>Step-By-Step Instructions for </a:t>
             </a:r>
             <a:r>
-              <a:rPr lang="en-US" dirty="0" err="1" smtClean="0"/>
+              <a:rPr lang="en-US" dirty="0" err="1"/>
               <a:t>Miniproject</a:t>
             </a:r>
             <a:r>
-              <a:rPr lang="en-US" dirty="0" smtClean="0"/>
+              <a:rPr lang="en-US" dirty="0"/>
               <a:t> 2</a:t>
             </a:r>
-            <a:endParaRPr lang="en-US" dirty="0"/>
           </a:p>
         </p:txBody>
       </p:sp>
@@ -6014,8 +5977,8 @@
         </p:nvSpPr>
         <p:spPr>
           <a:xfrm>
-            <a:off x="411291" y="1363843"/>
-            <a:ext cx="2467743" cy="5509201"/>
+            <a:off x="822583" y="5013687"/>
+            <a:ext cx="4935486" cy="10926068"/>
           </a:xfrm>
           <a:prstGeom prst="rect">
             <a:avLst/>
@@ -6029,81 +5992,81 @@
           <a:lstStyle/>
           <a:p>
             <a:r>
-              <a:rPr lang="en-US" sz="1600" dirty="0"/>
+              <a:rPr lang="en-US" sz="3200" dirty="0"/>
               <a:t>Trained using </a:t>
             </a:r>
           </a:p>
           <a:p>
             <a:r>
-              <a:rPr lang="en-US" sz="1600" dirty="0"/>
+              <a:rPr lang="en-US" sz="3200" dirty="0"/>
               <a:t>Step 1c (lambda=10)</a:t>
             </a:r>
           </a:p>
           <a:p>
             <a:r>
-              <a:rPr lang="en-US" sz="1600" dirty="0"/>
+              <a:rPr lang="en-US" sz="3200" dirty="0"/>
               <a:t>Stochastic GD</a:t>
             </a:r>
           </a:p>
           <a:p>
-            <a:endParaRPr lang="en-US" sz="1600" dirty="0"/>
-          </a:p>
-          <a:p>
-            <a:r>
-              <a:rPr lang="en-US" sz="1600" dirty="0"/>
+            <a:endParaRPr lang="en-US" sz="3200" dirty="0"/>
+          </a:p>
+          <a:p>
+            <a:r>
+              <a:rPr lang="en-US" sz="3200" dirty="0"/>
               <a:t>SVD of Movie Matrix</a:t>
             </a:r>
           </a:p>
           <a:p>
             <a:r>
-              <a:rPr lang="en-US" sz="1600" dirty="0"/>
+              <a:rPr lang="en-US" sz="3200" dirty="0"/>
               <a:t>Project top 2 bases</a:t>
             </a:r>
           </a:p>
           <a:p>
-            <a:endParaRPr lang="en-US" sz="1600" dirty="0"/>
-          </a:p>
-          <a:p>
-            <a:r>
-              <a:rPr lang="en-US" sz="1600" dirty="0"/>
+            <a:endParaRPr lang="en-US" sz="3200" dirty="0"/>
+          </a:p>
+          <a:p>
+            <a:r>
+              <a:rPr lang="en-US" sz="3200" dirty="0"/>
               <a:t>Picked a few popular movies, and plotted them.</a:t>
             </a:r>
           </a:p>
           <a:p>
-            <a:endParaRPr lang="en-US" sz="1600" dirty="0"/>
-          </a:p>
-          <a:p>
-            <a:r>
-              <a:rPr lang="en-US" sz="1600" dirty="0"/>
+            <a:endParaRPr lang="en-US" sz="3200" dirty="0"/>
+          </a:p>
+          <a:p>
+            <a:r>
+              <a:rPr lang="en-US" sz="3200" dirty="0"/>
               <a:t>Then found a few extreme points (e.g., Clockwork Orange). </a:t>
             </a:r>
           </a:p>
           <a:p>
-            <a:endParaRPr lang="en-US" sz="1600" dirty="0"/>
-          </a:p>
-          <a:p>
-            <a:r>
-              <a:rPr lang="en-US" sz="1600" dirty="0"/>
+            <a:endParaRPr lang="en-US" sz="3200" dirty="0"/>
+          </a:p>
+          <a:p>
+            <a:r>
+              <a:rPr lang="en-US" sz="3200" dirty="0"/>
               <a:t>Removed most children’s movies (didn’t seem to project well using 1</a:t>
             </a:r>
             <a:r>
-              <a:rPr lang="en-US" sz="1600" baseline="30000" dirty="0"/>
+              <a:rPr lang="en-US" sz="3200" baseline="30000" dirty="0"/>
               <a:t>st</a:t>
             </a:r>
             <a:r>
-              <a:rPr lang="en-US" sz="1600" dirty="0"/>
+              <a:rPr lang="en-US" sz="3200" dirty="0"/>
               <a:t> two SVD bases – maybe most ratings are by adults).</a:t>
             </a:r>
           </a:p>
           <a:p>
-            <a:endParaRPr lang="en-US" sz="1600" dirty="0"/>
-          </a:p>
-          <a:p>
-            <a:endParaRPr lang="en-US" sz="1600" dirty="0"/>
-          </a:p>
-          <a:p>
-            <a:r>
-              <a:rPr lang="en-US" sz="1600" dirty="0"/>
+            <a:endParaRPr lang="en-US" sz="3200" dirty="0"/>
+          </a:p>
+          <a:p>
+            <a:endParaRPr lang="en-US" sz="3200" dirty="0"/>
+          </a:p>
+          <a:p>
+            <a:r>
+              <a:rPr lang="en-US" sz="3200" dirty="0"/>
               <a:t> </a:t>
             </a:r>
           </a:p>
@@ -6117,8 +6080,8 @@
         </p:nvSpPr>
         <p:spPr>
           <a:xfrm>
-            <a:off x="4721599" y="5712664"/>
-            <a:ext cx="1465616" cy="523220"/>
+            <a:off x="9443199" y="13711329"/>
+            <a:ext cx="2721707" cy="954107"/>
           </a:xfrm>
           <a:prstGeom prst="rect">
             <a:avLst/>
@@ -6132,7 +6095,7 @@
           <a:lstStyle/>
           <a:p>
             <a:r>
-              <a:rPr lang="en-US" sz="1400" dirty="0">
+              <a:rPr lang="en-US" sz="2800" dirty="0">
                 <a:solidFill>
                   <a:schemeClr val="accent2">
                     <a:lumMod val="75000"/>
@@ -6144,7 +6107,7 @@
           </a:p>
           <a:p>
             <a:r>
-              <a:rPr lang="en-US" sz="1400" dirty="0">
+              <a:rPr lang="en-US" sz="2800" dirty="0">
                 <a:solidFill>
                   <a:schemeClr val="accent2">
                     <a:lumMod val="75000"/>
@@ -6164,8 +6127,8 @@
         </p:nvSpPr>
         <p:spPr>
           <a:xfrm>
-            <a:off x="6674809" y="4498309"/>
-            <a:ext cx="1267582" cy="523220"/>
+            <a:off x="13349619" y="11282619"/>
+            <a:ext cx="2429639" cy="954107"/>
           </a:xfrm>
           <a:prstGeom prst="rect">
             <a:avLst/>
@@ -6179,7 +6142,7 @@
           <a:lstStyle/>
           <a:p>
             <a:r>
-              <a:rPr lang="en-US" sz="1400" dirty="0">
+              <a:rPr lang="en-US" sz="2800" dirty="0">
                 <a:solidFill>
                   <a:schemeClr val="accent2">
                     <a:lumMod val="75000"/>
@@ -6191,7 +6154,7 @@
           </a:p>
           <a:p>
             <a:r>
-              <a:rPr lang="en-US" sz="1400" dirty="0">
+              <a:rPr lang="en-US" sz="2800" dirty="0">
                 <a:solidFill>
                   <a:schemeClr val="accent2">
                     <a:lumMod val="75000"/>
@@ -6211,8 +6174,8 @@
         </p:nvSpPr>
         <p:spPr>
           <a:xfrm>
-            <a:off x="3107926" y="3465013"/>
-            <a:ext cx="1224101" cy="307777"/>
+            <a:off x="6215853" y="9216026"/>
+            <a:ext cx="2265364" cy="523220"/>
           </a:xfrm>
           <a:prstGeom prst="rect">
             <a:avLst/>
@@ -6226,7 +6189,7 @@
           <a:lstStyle/>
           <a:p>
             <a:r>
-              <a:rPr lang="en-US" sz="1400" dirty="0">
+              <a:rPr lang="en-US" sz="2800" dirty="0">
                 <a:solidFill>
                   <a:schemeClr val="accent2">
                     <a:lumMod val="75000"/>
@@ -6246,8 +6209,8 @@
         </p:nvSpPr>
         <p:spPr>
           <a:xfrm>
-            <a:off x="2795746" y="5099490"/>
-            <a:ext cx="1925853" cy="523220"/>
+            <a:off x="5591493" y="12484982"/>
+            <a:ext cx="3633944" cy="954107"/>
           </a:xfrm>
           <a:prstGeom prst="rect">
             <a:avLst/>
@@ -6261,7 +6224,7 @@
           <a:lstStyle/>
           <a:p>
             <a:r>
-              <a:rPr lang="en-US" sz="1400" dirty="0">
+              <a:rPr lang="en-US" sz="2800" dirty="0">
                 <a:solidFill>
                   <a:schemeClr val="accent2">
                     <a:lumMod val="75000"/>
@@ -6273,7 +6236,7 @@
           </a:p>
           <a:p>
             <a:r>
-              <a:rPr lang="en-US" sz="1400" dirty="0">
+              <a:rPr lang="en-US" sz="2800" dirty="0">
                 <a:solidFill>
                   <a:schemeClr val="accent2">
                     <a:lumMod val="75000"/>
@@ -6293,8 +6256,8 @@
         </p:nvSpPr>
         <p:spPr>
           <a:xfrm>
-            <a:off x="6072511" y="2553069"/>
-            <a:ext cx="2621230" cy="307777"/>
+            <a:off x="12145024" y="7392137"/>
+            <a:ext cx="5003421" cy="523220"/>
           </a:xfrm>
           <a:prstGeom prst="rect">
             <a:avLst/>
@@ -6308,7 +6271,7 @@
           <a:lstStyle/>
           <a:p>
             <a:r>
-              <a:rPr lang="en-US" sz="1400" dirty="0">
+              <a:rPr lang="en-US" sz="2800" dirty="0">
                 <a:solidFill>
                   <a:schemeClr val="accent2">
                     <a:lumMod val="75000"/>
@@ -6318,7 +6281,7 @@
               <a:t>Free Willy Movies </a:t>
             </a:r>
             <a:r>
-              <a:rPr lang="en-US" sz="1400">
+              <a:rPr lang="en-US" sz="2800">
                 <a:solidFill>
                   <a:schemeClr val="accent2">
                     <a:lumMod val="75000"/>
@@ -6327,7 +6290,7 @@
               </a:rPr>
               <a:t>Close Together</a:t>
             </a:r>
-            <a:endParaRPr lang="en-US" sz="1400" dirty="0">
+            <a:endParaRPr lang="en-US" sz="2800" dirty="0">
               <a:solidFill>
                 <a:schemeClr val="accent2">
                   <a:lumMod val="75000"/>
@@ -6380,7 +6343,7 @@
         <p:spPr/>
         <p:txBody>
           <a:bodyPr>
-            <a:normAutofit fontScale="90000"/>
+            <a:normAutofit/>
           </a:bodyPr>
           <a:lstStyle/>
           <a:p>
@@ -6403,8 +6366,8 @@
         </p:nvSpPr>
         <p:spPr>
           <a:xfrm>
-            <a:off x="457200" y="4898301"/>
-            <a:ext cx="8229600" cy="1227863"/>
+            <a:off x="914400" y="12082603"/>
+            <a:ext cx="16459200" cy="2455726"/>
           </a:xfrm>
         </p:spPr>
         <p:txBody>
@@ -6422,7 +6385,7 @@
               <a:t>Goal #2: Visualize &amp; Interpret U &amp; V</a:t>
             </a:r>
             <a:r>
-              <a:rPr lang="en-US" sz="2400" dirty="0"/>
+              <a:rPr lang="en-US" sz="4800" dirty="0"/>
               <a:t>   (mostly V)</a:t>
             </a:r>
           </a:p>
@@ -6456,13 +6419,8 @@
             </a:r>
             <a:r>
               <a:rPr lang="en-US" dirty="0"/>
-              <a:t> </a:t>
-            </a:r>
-            <a:r>
-              <a:rPr lang="en-US" dirty="0" smtClean="0"/>
-              <a:t>2</a:t>
-            </a:r>
-            <a:endParaRPr lang="en-US" dirty="0"/>
+              <a:t> 2</a:t>
+            </a:r>
           </a:p>
         </p:txBody>
       </p:sp>
@@ -6497,8 +6455,8 @@
         </p:nvSpPr>
         <p:spPr>
           <a:xfrm>
-            <a:off x="1563798" y="2201855"/>
-            <a:ext cx="1774866" cy="2279625"/>
+            <a:off x="3127596" y="6689712"/>
+            <a:ext cx="3549731" cy="4559250"/>
           </a:xfrm>
           <a:prstGeom prst="rect">
             <a:avLst/>
@@ -6524,14 +6482,14 @@
           <a:p>
             <a:pPr algn="ctr"/>
             <a:r>
-              <a:rPr lang="en-US" sz="4400" b="1" dirty="0"/>
+              <a:rPr lang="en-US" sz="8800" b="1" dirty="0"/>
               <a:t>Y</a:t>
             </a:r>
           </a:p>
           <a:p>
             <a:pPr algn="ctr"/>
             <a:r>
-              <a:rPr lang="en-US" dirty="0"/>
+              <a:rPr lang="en-US" sz="5040" dirty="0"/>
               <a:t>(missing values)</a:t>
             </a:r>
           </a:p>
@@ -6545,8 +6503,8 @@
         </p:nvSpPr>
         <p:spPr>
           <a:xfrm>
-            <a:off x="1785898" y="1738588"/>
-            <a:ext cx="1361521" cy="461665"/>
+            <a:off x="3571798" y="5763176"/>
+            <a:ext cx="2535181" cy="830997"/>
           </a:xfrm>
           <a:prstGeom prst="rect">
             <a:avLst/>
@@ -6560,7 +6518,7 @@
           <a:lstStyle/>
           <a:p>
             <a:r>
-              <a:rPr lang="en-US" sz="2400" dirty="0"/>
+              <a:rPr lang="en-US" sz="4800" dirty="0"/>
               <a:t>N Movies</a:t>
             </a:r>
           </a:p>
@@ -6574,8 +6532,8 @@
         </p:nvSpPr>
         <p:spPr>
           <a:xfrm rot="16200000">
-            <a:off x="723225" y="3062798"/>
-            <a:ext cx="1216048" cy="461665"/>
+            <a:off x="1544691" y="8457764"/>
+            <a:ext cx="2235612" cy="830997"/>
           </a:xfrm>
           <a:prstGeom prst="rect">
             <a:avLst/>
@@ -6589,7 +6547,7 @@
           <a:lstStyle/>
           <a:p>
             <a:r>
-              <a:rPr lang="en-US" sz="2400" dirty="0"/>
+              <a:rPr lang="en-US" sz="4800" dirty="0"/>
               <a:t>M Users</a:t>
             </a:r>
           </a:p>
@@ -6603,8 +6561,8 @@
         </p:nvSpPr>
         <p:spPr>
           <a:xfrm>
-            <a:off x="4707801" y="2201855"/>
-            <a:ext cx="750335" cy="2279625"/>
+            <a:off x="9415604" y="6689712"/>
+            <a:ext cx="1500670" cy="4559250"/>
           </a:xfrm>
           <a:prstGeom prst="rect">
             <a:avLst/>
@@ -6630,11 +6588,11 @@
           <a:p>
             <a:pPr algn="ctr"/>
             <a:r>
-              <a:rPr lang="en-US" sz="4000" b="1" dirty="0"/>
+              <a:rPr lang="en-US" sz="8000" b="1" dirty="0"/>
               <a:t>U</a:t>
             </a:r>
             <a:r>
-              <a:rPr lang="en-US" sz="4000" b="1" baseline="30000" dirty="0"/>
+              <a:rPr lang="en-US" sz="8000" b="1" baseline="30000" dirty="0"/>
               <a:t>T</a:t>
             </a:r>
           </a:p>
@@ -6648,8 +6606,8 @@
         </p:nvSpPr>
         <p:spPr>
           <a:xfrm>
-            <a:off x="5609929" y="2201855"/>
-            <a:ext cx="1791379" cy="689072"/>
+            <a:off x="11219859" y="6689711"/>
+            <a:ext cx="3582759" cy="1378144"/>
           </a:xfrm>
           <a:prstGeom prst="rect">
             <a:avLst/>
@@ -6675,7 +6633,7 @@
           <a:p>
             <a:pPr algn="ctr"/>
             <a:r>
-              <a:rPr lang="en-US" sz="4400" b="1" dirty="0"/>
+              <a:rPr lang="en-US" sz="8800" b="1" dirty="0"/>
               <a:t>V</a:t>
             </a:r>
           </a:p>
@@ -6689,8 +6647,8 @@
         </p:nvSpPr>
         <p:spPr>
           <a:xfrm>
-            <a:off x="3594239" y="2733847"/>
-            <a:ext cx="644527" cy="1200329"/>
+            <a:off x="7188479" y="7753694"/>
+            <a:ext cx="1104790" cy="2308324"/>
           </a:xfrm>
           <a:prstGeom prst="rect">
             <a:avLst/>
@@ -6704,7 +6662,7 @@
           <a:lstStyle/>
           <a:p>
             <a:r>
-              <a:rPr lang="en-US" sz="7200" b="1" dirty="0"/>
+              <a:rPr lang="en-US" sz="14400" b="1" dirty="0"/>
               <a:t>=</a:t>
             </a:r>
           </a:p>
@@ -6718,8 +6676,8 @@
         </p:nvSpPr>
         <p:spPr>
           <a:xfrm>
-            <a:off x="6314357" y="1786628"/>
-            <a:ext cx="383338" cy="461665"/>
+            <a:off x="12628715" y="5859256"/>
+            <a:ext cx="582211" cy="830997"/>
           </a:xfrm>
           <a:prstGeom prst="rect">
             <a:avLst/>
@@ -6733,7 +6691,7 @@
           <a:lstStyle/>
           <a:p>
             <a:r>
-              <a:rPr lang="en-US" sz="2400" dirty="0"/>
+              <a:rPr lang="en-US" sz="4800" dirty="0"/>
               <a:t>N</a:t>
             </a:r>
           </a:p>
@@ -6747,8 +6705,8 @@
         </p:nvSpPr>
         <p:spPr>
           <a:xfrm>
-            <a:off x="4307946" y="3178870"/>
-            <a:ext cx="447809" cy="461665"/>
+            <a:off x="8615894" y="8643741"/>
+            <a:ext cx="710451" cy="830997"/>
           </a:xfrm>
           <a:prstGeom prst="rect">
             <a:avLst/>
@@ -6762,7 +6720,7 @@
           <a:lstStyle/>
           <a:p>
             <a:r>
-              <a:rPr lang="en-US" sz="2400" dirty="0"/>
+              <a:rPr lang="en-US" sz="4800" dirty="0"/>
               <a:t>M</a:t>
             </a:r>
           </a:p>
@@ -6776,8 +6734,8 @@
         </p:nvSpPr>
         <p:spPr>
           <a:xfrm>
-            <a:off x="4909450" y="1786628"/>
-            <a:ext cx="344565" cy="461665"/>
+            <a:off x="9818901" y="5859256"/>
+            <a:ext cx="505267" cy="830997"/>
           </a:xfrm>
           <a:prstGeom prst="rect">
             <a:avLst/>
@@ -6791,7 +6749,7 @@
           <a:lstStyle/>
           <a:p>
             <a:r>
-              <a:rPr lang="en-US" sz="2400" dirty="0"/>
+              <a:rPr lang="en-US" sz="4800" dirty="0"/>
               <a:t>K</a:t>
             </a:r>
           </a:p>
@@ -6805,8 +6763,8 @@
         </p:nvSpPr>
         <p:spPr>
           <a:xfrm>
-            <a:off x="7378057" y="2276514"/>
-            <a:ext cx="344565" cy="461665"/>
+            <a:off x="14756115" y="6839029"/>
+            <a:ext cx="505267" cy="830997"/>
           </a:xfrm>
           <a:prstGeom prst="rect">
             <a:avLst/>
@@ -6820,7 +6778,7 @@
           <a:lstStyle/>
           <a:p>
             <a:r>
-              <a:rPr lang="en-US" sz="2400" dirty="0"/>
+              <a:rPr lang="en-US" sz="4800" dirty="0"/>
               <a:t>K</a:t>
             </a:r>
           </a:p>
@@ -6834,8 +6792,8 @@
         </p:nvSpPr>
         <p:spPr>
           <a:xfrm>
-            <a:off x="6111215" y="3534066"/>
-            <a:ext cx="1882221" cy="400110"/>
+            <a:off x="12222431" y="9354131"/>
+            <a:ext cx="3535648" cy="707886"/>
           </a:xfrm>
           <a:prstGeom prst="rect">
             <a:avLst/>
@@ -6849,7 +6807,7 @@
           <a:lstStyle/>
           <a:p>
             <a:r>
-              <a:rPr lang="en-US" sz="2000" dirty="0">
+              <a:rPr lang="en-US" sz="4000" dirty="0">
                 <a:solidFill>
                   <a:schemeClr val="accent2">
                     <a:lumMod val="75000"/>
@@ -6871,8 +6829,8 @@
         </p:nvCxnSpPr>
         <p:spPr>
           <a:xfrm flipH="1" flipV="1">
-            <a:off x="5716206" y="3534066"/>
-            <a:ext cx="395009" cy="200055"/>
+            <a:off x="11432417" y="9354139"/>
+            <a:ext cx="790014" cy="353935"/>
           </a:xfrm>
           <a:prstGeom prst="straightConnector1">
             <a:avLst/>
@@ -6911,8 +6869,8 @@
         </p:nvCxnSpPr>
         <p:spPr>
           <a:xfrm flipV="1">
-            <a:off x="6404108" y="3058974"/>
-            <a:ext cx="0" cy="475092"/>
+            <a:off x="12808216" y="8403949"/>
+            <a:ext cx="0" cy="950184"/>
           </a:xfrm>
           <a:prstGeom prst="straightConnector1">
             <a:avLst/>
@@ -6985,8 +6943,8 @@
         </p:nvSpPr>
         <p:spPr>
           <a:xfrm>
-            <a:off x="457200" y="208569"/>
-            <a:ext cx="8229600" cy="1143000"/>
+            <a:off x="914400" y="2703139"/>
+            <a:ext cx="16459200" cy="2286000"/>
           </a:xfrm>
         </p:spPr>
         <p:txBody>
@@ -6996,7 +6954,7 @@
           <a:lstStyle/>
           <a:p>
             <a:r>
-              <a:rPr lang="en-US" sz="3600" dirty="0">
+              <a:rPr lang="en-US" sz="7200" dirty="0">
                 <a:solidFill>
                   <a:schemeClr val="accent2">
                     <a:lumMod val="75000"/>
@@ -7006,7 +6964,7 @@
               <a:t>Final Product: </a:t>
             </a:r>
             <a:r>
-              <a:rPr lang="en-US" sz="3600" dirty="0"/>
+              <a:rPr lang="en-US" sz="7200" dirty="0"/>
               <a:t>Create Something Like This</a:t>
             </a:r>
           </a:p>
@@ -7032,14 +6990,13 @@
               <a:t>Step-By-Step Instructions for </a:t>
             </a:r>
             <a:r>
-              <a:rPr lang="en-US" dirty="0" err="1" smtClean="0"/>
+              <a:rPr lang="en-US" dirty="0" err="1"/>
               <a:t>Miniproject</a:t>
             </a:r>
             <a:r>
-              <a:rPr lang="en-US" dirty="0" smtClean="0"/>
+              <a:rPr lang="en-US" dirty="0"/>
               <a:t> 2</a:t>
             </a:r>
-            <a:endParaRPr lang="en-US" dirty="0"/>
           </a:p>
         </p:txBody>
       </p:sp>
@@ -7082,8 +7039,8 @@
         </p:blipFill>
         <p:spPr>
           <a:xfrm>
-            <a:off x="1133621" y="1351569"/>
-            <a:ext cx="4598016" cy="3414369"/>
+            <a:off x="2267243" y="4989139"/>
+            <a:ext cx="9196031" cy="6828739"/>
           </a:xfrm>
           <a:prstGeom prst="rect">
             <a:avLst/>
@@ -7098,8 +7055,8 @@
         </p:nvSpPr>
         <p:spPr>
           <a:xfrm>
-            <a:off x="524667" y="6202461"/>
-            <a:ext cx="6112457" cy="307777"/>
+            <a:off x="1049334" y="14690924"/>
+            <a:ext cx="12224914" cy="523220"/>
           </a:xfrm>
           <a:prstGeom prst="rect">
             <a:avLst/>
@@ -7112,22 +7069,22 @@
           <a:lstStyle/>
           <a:p>
             <a:r>
-              <a:rPr lang="en-US" sz="1400" dirty="0"/>
+              <a:rPr lang="en-US" sz="2800" dirty="0"/>
               <a:t>http://www2.research.att.com/~</a:t>
             </a:r>
             <a:r>
-              <a:rPr lang="en-US" sz="1400" dirty="0" err="1"/>
+              <a:rPr lang="en-US" sz="2800" dirty="0" err="1"/>
               <a:t>volinsky</a:t>
             </a:r>
             <a:r>
-              <a:rPr lang="en-US" sz="1400" dirty="0"/>
+              <a:rPr lang="en-US" sz="2800" dirty="0"/>
               <a:t>/papers/</a:t>
             </a:r>
             <a:r>
-              <a:rPr lang="en-US" sz="1400" dirty="0" err="1"/>
+              <a:rPr lang="en-US" sz="2800" dirty="0" err="1"/>
               <a:t>ieeecomputer.pdf</a:t>
             </a:r>
-            <a:endParaRPr lang="en-US" sz="1400" dirty="0"/>
+            <a:endParaRPr lang="en-US" sz="2800" dirty="0"/>
           </a:p>
         </p:txBody>
       </p:sp>
@@ -7139,8 +7096,8 @@
         </p:nvSpPr>
         <p:spPr>
           <a:xfrm>
-            <a:off x="524667" y="4993616"/>
-            <a:ext cx="7902678" cy="1077218"/>
+            <a:off x="1049335" y="12273232"/>
+            <a:ext cx="15805356" cy="4278094"/>
           </a:xfrm>
           <a:prstGeom prst="rect">
             <a:avLst/>
@@ -7154,16 +7111,16 @@
           <a:lstStyle/>
           <a:p>
             <a:r>
-              <a:rPr lang="en-US" dirty="0"/>
+              <a:rPr lang="en-US" sz="5040" dirty="0"/>
               <a:t>You need to create  your own visualization (will have different projection of movies/users onto 2-dimensional plane than example above)</a:t>
             </a:r>
           </a:p>
           <a:p>
-            <a:endParaRPr lang="en-US" sz="1000" dirty="0"/>
-          </a:p>
-          <a:p>
-            <a:r>
-              <a:rPr lang="en-US" dirty="0"/>
+            <a:endParaRPr lang="en-US" sz="2000" dirty="0"/>
+          </a:p>
+          <a:p>
+            <a:r>
+              <a:rPr lang="en-US" sz="5040" dirty="0"/>
               <a:t>You need to interpret your dimensions and/or clusters of movies in your projection</a:t>
             </a:r>
           </a:p>
@@ -7177,8 +7134,8 @@
         </p:nvSpPr>
         <p:spPr>
           <a:xfrm>
-            <a:off x="5945288" y="2707550"/>
-            <a:ext cx="2482057" cy="923330"/>
+            <a:off x="11890576" y="7701102"/>
+            <a:ext cx="6757812" cy="2419124"/>
           </a:xfrm>
           <a:prstGeom prst="rect">
             <a:avLst/>
@@ -7192,7 +7149,7 @@
           <a:lstStyle/>
           <a:p>
             <a:r>
-              <a:rPr lang="en-US" dirty="0">
+              <a:rPr lang="en-US" sz="5040" dirty="0">
                 <a:solidFill>
                   <a:srgbClr val="953735"/>
                 </a:solidFill>
@@ -7202,7 +7159,7 @@
           </a:p>
           <a:p>
             <a:r>
-              <a:rPr lang="en-US" dirty="0">
+              <a:rPr lang="en-US" sz="5040" dirty="0">
                 <a:solidFill>
                   <a:srgbClr val="953735"/>
                 </a:solidFill>
@@ -7212,7 +7169,7 @@
           </a:p>
           <a:p>
             <a:r>
-              <a:rPr lang="en-US" dirty="0">
+              <a:rPr lang="en-US" sz="5040" dirty="0">
                 <a:solidFill>
                   <a:srgbClr val="953735"/>
                 </a:solidFill>
@@ -7297,7 +7254,7 @@
             </a:r>
           </a:p>
           <a:p>
-            <a:endParaRPr lang="en-US" sz="2600" dirty="0"/>
+            <a:endParaRPr lang="en-US" sz="5200" dirty="0"/>
           </a:p>
           <a:p>
             <a:r>
@@ -7321,7 +7278,7 @@
             </a:r>
           </a:p>
           <a:p>
-            <a:endParaRPr lang="en-US" sz="2600" dirty="0"/>
+            <a:endParaRPr lang="en-US" sz="5200" dirty="0"/>
           </a:p>
           <a:p>
             <a:r>
@@ -7358,14 +7315,13 @@
               <a:t>Step-By-Step Instructions for </a:t>
             </a:r>
             <a:r>
-              <a:rPr lang="en-US" dirty="0" err="1" smtClean="0"/>
+              <a:rPr lang="en-US" dirty="0" err="1"/>
               <a:t>Miniproject</a:t>
             </a:r>
             <a:r>
-              <a:rPr lang="en-US" dirty="0" smtClean="0"/>
+              <a:rPr lang="en-US" dirty="0"/>
               <a:t> 2</a:t>
             </a:r>
-            <a:endParaRPr lang="en-US" dirty="0"/>
           </a:p>
         </p:txBody>
       </p:sp>
@@ -7456,8 +7412,8 @@
         </p:nvSpPr>
         <p:spPr>
           <a:xfrm>
-            <a:off x="457200" y="3782541"/>
-            <a:ext cx="8229600" cy="2573808"/>
+            <a:off x="914400" y="9851083"/>
+            <a:ext cx="16459200" cy="5147616"/>
           </a:xfrm>
         </p:spPr>
         <p:txBody>
@@ -7499,14 +7455,13 @@
               <a:t>Step-By-Step Instructions for </a:t>
             </a:r>
             <a:r>
-              <a:rPr lang="en-US" dirty="0" err="1" smtClean="0"/>
+              <a:rPr lang="en-US" dirty="0" err="1"/>
               <a:t>Miniproject</a:t>
             </a:r>
             <a:r>
-              <a:rPr lang="en-US" dirty="0" smtClean="0"/>
+              <a:rPr lang="en-US" dirty="0"/>
               <a:t> 2</a:t>
             </a:r>
-            <a:endParaRPr lang="en-US" dirty="0"/>
           </a:p>
         </p:txBody>
       </p:sp>
@@ -7548,14 +7503,14 @@
           </p:nvPr>
         </p:nvGraphicFramePr>
         <p:xfrm>
-          <a:off x="2242186" y="2054541"/>
-          <a:ext cx="5161694" cy="929105"/>
+          <a:off x="4484371" y="6395084"/>
+          <a:ext cx="10323389" cy="1858210"/>
         </p:xfrm>
         <a:graphic>
           <a:graphicData uri="http://schemas.openxmlformats.org/presentationml/2006/ole">
             <mc:AlternateContent xmlns:mc="http://schemas.openxmlformats.org/markup-compatibility/2006">
               <mc:Choice xmlns:v="urn:schemas-microsoft-com:vml" Requires="v">
-                <p:oleObj spid="_x0000_s1136" name="Equation" r:id="rId3" imgW="2540000" imgH="457200" progId="Equation.3">
+                <p:oleObj spid="_x0000_s1141" name="Equation" r:id="rId3" imgW="2540000" imgH="457200" progId="Equation.3">
                   <p:embed/>
                 </p:oleObj>
               </mc:Choice>
@@ -7576,8 +7531,8 @@
                     </p:blipFill>
                     <p:spPr>
                       <a:xfrm>
-                        <a:off x="2242186" y="2054541"/>
-                        <a:ext cx="5161694" cy="929105"/>
+                        <a:off x="4484371" y="6395084"/>
+                        <a:ext cx="10323389" cy="1858210"/>
                       </a:xfrm>
                       <a:prstGeom prst="rect">
                         <a:avLst/>
@@ -7598,8 +7553,8 @@
         </p:nvSpPr>
         <p:spPr>
           <a:xfrm>
-            <a:off x="6220295" y="2904771"/>
-            <a:ext cx="2098276" cy="646331"/>
+            <a:off x="12440591" y="8095543"/>
+            <a:ext cx="5687519" cy="1643527"/>
           </a:xfrm>
           <a:prstGeom prst="rect">
             <a:avLst/>
@@ -7613,7 +7568,7 @@
           <a:lstStyle/>
           <a:p>
             <a:r>
-              <a:rPr lang="en-US" dirty="0">
+              <a:rPr lang="en-US" sz="5040" dirty="0">
                 <a:solidFill>
                   <a:srgbClr val="800000"/>
                 </a:solidFill>
@@ -7621,7 +7576,7 @@
               <a:t>S = set of indices (</a:t>
             </a:r>
             <a:r>
-              <a:rPr lang="en-US" dirty="0" err="1">
+              <a:rPr lang="en-US" sz="5040" dirty="0" err="1">
                 <a:solidFill>
                   <a:srgbClr val="800000"/>
                 </a:solidFill>
@@ -7629,7 +7584,7 @@
               <a:t>i,j</a:t>
             </a:r>
             <a:r>
-              <a:rPr lang="en-US" dirty="0">
+              <a:rPr lang="en-US" sz="5040" dirty="0">
                 <a:solidFill>
                   <a:srgbClr val="800000"/>
                 </a:solidFill>
@@ -7639,7 +7594,7 @@
           </a:p>
           <a:p>
             <a:r>
-              <a:rPr lang="en-US" dirty="0">
+              <a:rPr lang="en-US" sz="5040" dirty="0">
                 <a:solidFill>
                   <a:srgbClr val="800000"/>
                 </a:solidFill>
@@ -7659,8 +7614,8 @@
         </p:nvCxnSpPr>
         <p:spPr>
           <a:xfrm flipH="1" flipV="1">
-            <a:off x="5842000" y="2904771"/>
-            <a:ext cx="378295" cy="323166"/>
+            <a:off x="11684002" y="8095544"/>
+            <a:ext cx="756589" cy="821763"/>
           </a:xfrm>
           <a:prstGeom prst="straightConnector1">
             <a:avLst/>
@@ -7699,8 +7654,8 @@
         </p:nvSpPr>
         <p:spPr>
           <a:xfrm>
-            <a:off x="275414" y="1535094"/>
-            <a:ext cx="4803456" cy="369332"/>
+            <a:off x="550830" y="5356189"/>
+            <a:ext cx="13100894" cy="867930"/>
           </a:xfrm>
           <a:prstGeom prst="rect">
             <a:avLst/>
@@ -7714,7 +7669,7 @@
           <a:lstStyle/>
           <a:p>
             <a:r>
-              <a:rPr lang="en-US" dirty="0">
+              <a:rPr lang="en-US" sz="5040" dirty="0">
                 <a:solidFill>
                   <a:srgbClr val="800000"/>
                 </a:solidFill>
@@ -7733,9 +7688,9 @@
           <p:nvPr/>
         </p:nvCxnSpPr>
         <p:spPr>
-          <a:xfrm>
-            <a:off x="2677142" y="1904426"/>
-            <a:ext cx="376670" cy="224977"/>
+          <a:xfrm flipH="1">
+            <a:off x="6107626" y="6224119"/>
+            <a:ext cx="993651" cy="320688"/>
           </a:xfrm>
           <a:prstGeom prst="straightConnector1">
             <a:avLst/>
@@ -7774,8 +7729,8 @@
         </p:nvSpPr>
         <p:spPr>
           <a:xfrm>
-            <a:off x="5316741" y="1417638"/>
-            <a:ext cx="3565740" cy="523220"/>
+            <a:off x="10633481" y="5121277"/>
+            <a:ext cx="7131480" cy="954107"/>
           </a:xfrm>
           <a:prstGeom prst="rect">
             <a:avLst/>
@@ -7788,11 +7743,11 @@
           <a:lstStyle/>
           <a:p>
             <a:r>
-              <a:rPr lang="en-US" sz="1400" dirty="0"/>
+              <a:rPr lang="en-US" sz="2800" dirty="0"/>
               <a:t> </a:t>
             </a:r>
             <a:r>
-              <a:rPr lang="en-US" sz="1400" dirty="0">
+              <a:rPr lang="en-US" sz="2800" dirty="0">
                 <a:solidFill>
                   <a:schemeClr val="accent4">
                     <a:lumMod val="75000"/>
@@ -7804,7 +7759,7 @@
           </a:p>
           <a:p>
             <a:r>
-              <a:rPr lang="en-US" sz="1400" dirty="0">
+              <a:rPr lang="en-US" sz="2800" dirty="0">
                 <a:solidFill>
                   <a:schemeClr val="accent4">
                     <a:lumMod val="75000"/>
@@ -7885,32 +7840,32 @@
           </a:bodyPr>
           <a:lstStyle/>
           <a:p>
-            <a:pPr marL="342900" lvl="2" indent="-342900"/>
-            <a:r>
-              <a:rPr lang="en-US" sz="2000" dirty="0"/>
+            <a:pPr marL="685814" lvl="2" indent="-685814"/>
+            <a:r>
+              <a:rPr lang="en-US" sz="4000" dirty="0"/>
               <a:t>Search for “Collaborative Filtering </a:t>
             </a:r>
             <a:r>
-              <a:rPr lang="en-US" sz="2000" dirty="0" err="1"/>
+              <a:rPr lang="en-US" sz="4000" dirty="0" err="1"/>
               <a:t>Matlab</a:t>
             </a:r>
             <a:r>
-              <a:rPr lang="en-US" sz="2000" dirty="0"/>
+              <a:rPr lang="en-US" sz="4000" dirty="0"/>
               <a:t>” or “Collaborative Filtering Python” or “Collaborative Filtering code”</a:t>
             </a:r>
           </a:p>
           <a:p>
-            <a:pPr marL="342900" lvl="2" indent="-342900"/>
-            <a:endParaRPr lang="en-US" sz="2000" dirty="0"/>
-          </a:p>
-          <a:p>
-            <a:endParaRPr lang="en-US" sz="2000" dirty="0">
+            <a:pPr marL="685814" lvl="2" indent="-685814"/>
+            <a:endParaRPr lang="en-US" sz="4000" dirty="0"/>
+          </a:p>
+          <a:p>
+            <a:endParaRPr lang="en-US" sz="4000" dirty="0">
               <a:hlinkClick r:id="rId2"/>
             </a:endParaRPr>
           </a:p>
           <a:p>
             <a:r>
-              <a:rPr lang="en-US" sz="2000" dirty="0">
+              <a:rPr lang="en-US" sz="4000" dirty="0">
                 <a:hlinkClick r:id="rId2"/>
               </a:rPr>
               <a:t>https://cambridgespark.com/content/tutorials/implementing-your-own-recommender-systems-in-Python/index.html</a:t>
@@ -7918,7 +7873,7 @@
           </a:p>
           <a:p>
             <a:r>
-              <a:rPr lang="en-US" sz="2000" dirty="0">
+              <a:rPr lang="en-US" sz="4000" dirty="0">
                 <a:hlinkClick r:id="rId2"/>
               </a:rPr>
               <a:t>https://www.analyticsvidhya.com/blog/2016/06/quick-guide-build-recommendation-engine-python/</a:t>
@@ -7926,15 +7881,15 @@
           </a:p>
           <a:p>
             <a:r>
-              <a:rPr lang="en-US" sz="2000" dirty="0">
+              <a:rPr lang="en-US" sz="4000" dirty="0">
                 <a:hlinkClick r:id="rId3"/>
               </a:rPr>
               <a:t>http://surpriselib.com/</a:t>
             </a:r>
-            <a:endParaRPr lang="en-US" sz="2000" dirty="0"/>
-          </a:p>
-          <a:p>
-            <a:endParaRPr lang="en-US" sz="2000" dirty="0"/>
+            <a:endParaRPr lang="en-US" sz="4000" dirty="0"/>
+          </a:p>
+          <a:p>
+            <a:endParaRPr lang="en-US" sz="4000" dirty="0"/>
           </a:p>
         </p:txBody>
       </p:sp>
@@ -7958,14 +7913,13 @@
               <a:t>Step-By-Step Instructions for </a:t>
             </a:r>
             <a:r>
-              <a:rPr lang="en-US" dirty="0" err="1" smtClean="0"/>
+              <a:rPr lang="en-US" dirty="0" err="1"/>
               <a:t>Miniproject</a:t>
             </a:r>
             <a:r>
-              <a:rPr lang="en-US" dirty="0" smtClean="0"/>
+              <a:rPr lang="en-US" dirty="0"/>
               <a:t> 2</a:t>
             </a:r>
-            <a:endParaRPr lang="en-US" dirty="0"/>
           </a:p>
         </p:txBody>
       </p:sp>
@@ -8035,7 +7989,7 @@
         <p:spPr/>
         <p:txBody>
           <a:bodyPr>
-            <a:normAutofit fontScale="90000"/>
+            <a:normAutofit/>
           </a:bodyPr>
           <a:lstStyle/>
           <a:p>
@@ -8047,7 +8001,7 @@
               <a:rPr lang="en-US" dirty="0"/>
             </a:br>
             <a:r>
-              <a:rPr lang="en-US" sz="3600" dirty="0">
+              <a:rPr lang="en-US" sz="7200" dirty="0">
                 <a:solidFill>
                   <a:srgbClr val="953735"/>
                 </a:solidFill>
@@ -8069,37 +8023,37 @@
         </p:nvSpPr>
         <p:spPr>
           <a:xfrm>
-            <a:off x="457200" y="3875862"/>
-            <a:ext cx="8229600" cy="2480488"/>
+            <a:off x="914400" y="10037725"/>
+            <a:ext cx="16459200" cy="4960976"/>
           </a:xfrm>
         </p:spPr>
         <p:txBody>
           <a:bodyPr>
-            <a:normAutofit lnSpcReduction="10000"/>
+            <a:normAutofit/>
           </a:bodyPr>
           <a:lstStyle/>
           <a:p>
             <a:r>
-              <a:rPr lang="en-US" sz="2400" dirty="0"/>
+              <a:rPr lang="en-US" sz="4800" dirty="0"/>
               <a:t>Model the global tendency of a movie’s average rating</a:t>
             </a:r>
           </a:p>
           <a:p>
             <a:r>
-              <a:rPr lang="en-US" sz="2400" dirty="0"/>
+              <a:rPr lang="en-US" sz="4800" dirty="0"/>
               <a:t>Model the global tendency of how a user rates on average</a:t>
             </a:r>
-            <a:endParaRPr lang="en-US" sz="2000" dirty="0"/>
-          </a:p>
-          <a:p>
-            <a:r>
-              <a:rPr lang="en-US" sz="2400" dirty="0"/>
+            <a:endParaRPr lang="en-US" sz="4000" dirty="0"/>
+          </a:p>
+          <a:p>
+            <a:r>
+              <a:rPr lang="en-US" sz="4800" dirty="0"/>
               <a:t>This keeps U &amp; V more focused on variability between users and movies.</a:t>
             </a:r>
           </a:p>
           <a:p>
             <a:r>
-              <a:rPr lang="en-US" sz="2400" dirty="0"/>
+              <a:rPr lang="en-US" sz="4800" dirty="0"/>
               <a:t>Should be an option that you can turn on in many off-the-shelf implementations</a:t>
             </a:r>
           </a:p>
@@ -8125,14 +8079,13 @@
               <a:t>Step-By-Step Instructions for </a:t>
             </a:r>
             <a:r>
-              <a:rPr lang="en-US" dirty="0" err="1" smtClean="0"/>
+              <a:rPr lang="en-US" dirty="0" err="1"/>
               <a:t>Miniproject</a:t>
             </a:r>
             <a:r>
-              <a:rPr lang="en-US" dirty="0" smtClean="0"/>
+              <a:rPr lang="en-US" dirty="0"/>
               <a:t> 2</a:t>
             </a:r>
-            <a:endParaRPr lang="en-US" dirty="0"/>
           </a:p>
         </p:txBody>
       </p:sp>
@@ -8174,14 +8127,14 @@
           </p:nvPr>
         </p:nvGraphicFramePr>
         <p:xfrm>
-          <a:off x="1635125" y="1936750"/>
-          <a:ext cx="6375400" cy="928688"/>
+          <a:off x="3270250" y="6159501"/>
+          <a:ext cx="12750800" cy="1857376"/>
         </p:xfrm>
         <a:graphic>
           <a:graphicData uri="http://schemas.openxmlformats.org/presentationml/2006/ole">
             <mc:AlternateContent xmlns:mc="http://schemas.openxmlformats.org/markup-compatibility/2006">
               <mc:Choice xmlns:v="urn:schemas-microsoft-com:vml" Requires="v">
-                <p:oleObj spid="_x0000_s91210" name="Equation" r:id="rId3" imgW="3136900" imgH="457200" progId="Equation.3">
+                <p:oleObj spid="_x0000_s91215" name="Equation" r:id="rId3" imgW="3136900" imgH="457200" progId="Equation.3">
                   <p:embed/>
                 </p:oleObj>
               </mc:Choice>
@@ -8202,8 +8155,8 @@
                     </p:blipFill>
                     <p:spPr>
                       <a:xfrm>
-                        <a:off x="1635125" y="1936750"/>
-                        <a:ext cx="6375400" cy="928688"/>
+                        <a:off x="3270250" y="6159501"/>
+                        <a:ext cx="12750800" cy="1857376"/>
                       </a:xfrm>
                       <a:prstGeom prst="rect">
                         <a:avLst/>
@@ -8224,8 +8177,8 @@
         </p:nvSpPr>
         <p:spPr>
           <a:xfrm>
-            <a:off x="2270896" y="3042458"/>
-            <a:ext cx="2098276" cy="646331"/>
+            <a:off x="4541792" y="8370918"/>
+            <a:ext cx="5833392" cy="1643527"/>
           </a:xfrm>
           <a:prstGeom prst="rect">
             <a:avLst/>
@@ -8239,7 +8192,7 @@
           <a:lstStyle/>
           <a:p>
             <a:r>
-              <a:rPr lang="en-US" dirty="0">
+              <a:rPr lang="en-US" sz="5040" dirty="0">
                 <a:solidFill>
                   <a:srgbClr val="800000"/>
                 </a:solidFill>
@@ -8247,7 +8200,7 @@
               <a:t>S = set of indices (</a:t>
             </a:r>
             <a:r>
-              <a:rPr lang="en-US" dirty="0" err="1">
+              <a:rPr lang="en-US" sz="5040" dirty="0" err="1">
                 <a:solidFill>
                   <a:srgbClr val="800000"/>
                 </a:solidFill>
@@ -8255,7 +8208,7 @@
               <a:t>i,j</a:t>
             </a:r>
             <a:r>
-              <a:rPr lang="en-US" dirty="0">
+              <a:rPr lang="en-US" sz="5040" dirty="0">
                 <a:solidFill>
                   <a:srgbClr val="800000"/>
                 </a:solidFill>
@@ -8265,7 +8218,7 @@
           </a:p>
           <a:p>
             <a:r>
-              <a:rPr lang="en-US" dirty="0">
+              <a:rPr lang="en-US" sz="5040" dirty="0">
                 <a:solidFill>
                   <a:srgbClr val="800000"/>
                 </a:solidFill>
@@ -8284,9 +8237,9 @@
           <p:nvPr/>
         </p:nvCxnSpPr>
         <p:spPr>
-          <a:xfrm flipV="1">
-            <a:off x="4369172" y="2865438"/>
-            <a:ext cx="644658" cy="500186"/>
+          <a:xfrm flipH="1" flipV="1">
+            <a:off x="10027661" y="8016878"/>
+            <a:ext cx="347523" cy="1175804"/>
           </a:xfrm>
           <a:prstGeom prst="straightConnector1">
             <a:avLst/>
@@ -8325,8 +8278,8 @@
         </p:nvSpPr>
         <p:spPr>
           <a:xfrm>
-            <a:off x="708527" y="1563270"/>
-            <a:ext cx="4803456" cy="369332"/>
+            <a:off x="1417056" y="5412541"/>
+            <a:ext cx="13100894" cy="867930"/>
           </a:xfrm>
           <a:prstGeom prst="rect">
             <a:avLst/>
@@ -8340,7 +8293,7 @@
           <a:lstStyle/>
           <a:p>
             <a:r>
-              <a:rPr lang="en-US" dirty="0">
+              <a:rPr lang="en-US" sz="5040" dirty="0">
                 <a:solidFill>
                   <a:srgbClr val="800000"/>
                 </a:solidFill>
@@ -8358,8 +8311,8 @@
         </p:nvCxnSpPr>
         <p:spPr>
           <a:xfrm>
-            <a:off x="2429836" y="1899458"/>
-            <a:ext cx="139477" cy="224977"/>
+            <a:off x="4859673" y="6084917"/>
+            <a:ext cx="278954" cy="449954"/>
           </a:xfrm>
           <a:prstGeom prst="straightConnector1">
             <a:avLst/>
@@ -8398,8 +8351,8 @@
         </p:nvSpPr>
         <p:spPr>
           <a:xfrm>
-            <a:off x="5433062" y="3042458"/>
-            <a:ext cx="2694067" cy="646331"/>
+            <a:off x="10866124" y="8370918"/>
+            <a:ext cx="7199022" cy="1643527"/>
           </a:xfrm>
           <a:prstGeom prst="rect">
             <a:avLst/>
@@ -8413,7 +8366,7 @@
           <a:lstStyle/>
           <a:p>
             <a:r>
-              <a:rPr lang="en-US" dirty="0">
+              <a:rPr lang="en-US" sz="5040" dirty="0">
                 <a:solidFill>
                   <a:srgbClr val="800000"/>
                 </a:solidFill>
@@ -8423,7 +8376,7 @@
           </a:p>
           <a:p>
             <a:r>
-              <a:rPr lang="en-US" dirty="0">
+              <a:rPr lang="en-US" sz="5040" dirty="0">
                 <a:solidFill>
                   <a:srgbClr val="800000"/>
                 </a:solidFill>
@@ -8442,9 +8395,9 @@
           <p:nvPr/>
         </p:nvCxnSpPr>
         <p:spPr>
-          <a:xfrm flipV="1">
-            <a:off x="6780096" y="2583908"/>
-            <a:ext cx="120344" cy="458550"/>
+          <a:xfrm flipH="1" flipV="1">
+            <a:off x="13800883" y="7453817"/>
+            <a:ext cx="664752" cy="917101"/>
           </a:xfrm>
           <a:prstGeom prst="straightConnector1">
             <a:avLst/>
@@ -8485,8 +8438,8 @@
         </p:nvCxnSpPr>
         <p:spPr>
           <a:xfrm flipV="1">
-            <a:off x="6780096" y="2583908"/>
-            <a:ext cx="502070" cy="458550"/>
+            <a:off x="14465635" y="7453817"/>
+            <a:ext cx="98699" cy="917101"/>
           </a:xfrm>
           <a:prstGeom prst="straightConnector1">
             <a:avLst/>
@@ -8560,7 +8513,7 @@
         <p:spPr/>
         <p:txBody>
           <a:bodyPr>
-            <a:normAutofit fontScale="90000"/>
+            <a:normAutofit/>
           </a:bodyPr>
           <a:lstStyle/>
           <a:p>
@@ -8572,7 +8525,7 @@
               <a:rPr lang="en-US" dirty="0"/>
             </a:br>
             <a:r>
-              <a:rPr lang="en-US" sz="3600" dirty="0">
+              <a:rPr lang="en-US" sz="7200" dirty="0">
                 <a:solidFill>
                   <a:srgbClr val="953735"/>
                 </a:solidFill>
@@ -8594,8 +8547,8 @@
         </p:nvSpPr>
         <p:spPr>
           <a:xfrm>
-            <a:off x="457200" y="3875862"/>
-            <a:ext cx="8229600" cy="2480488"/>
+            <a:off x="914400" y="10037725"/>
+            <a:ext cx="16459200" cy="4960976"/>
           </a:xfrm>
         </p:spPr>
         <p:txBody>
@@ -8605,30 +8558,30 @@
           <a:lstStyle/>
           <a:p>
             <a:r>
-              <a:rPr lang="en-US" sz="2400" dirty="0"/>
+              <a:rPr lang="en-US" sz="4800" dirty="0"/>
               <a:t>Model global bias μ as average over all observed Y</a:t>
             </a:r>
           </a:p>
           <a:p>
             <a:r>
-              <a:rPr lang="en-US" sz="2400" dirty="0"/>
+              <a:rPr lang="en-US" sz="4800" dirty="0"/>
               <a:t>Treat a as user-specific deviation from global bias</a:t>
             </a:r>
           </a:p>
           <a:p>
             <a:r>
-              <a:rPr lang="en-US" sz="2400" dirty="0"/>
+              <a:rPr lang="en-US" sz="4800" dirty="0"/>
               <a:t>Treat b as movie-specific deviation from global bias</a:t>
             </a:r>
-            <a:endParaRPr lang="en-US" sz="2000" dirty="0"/>
-          </a:p>
-          <a:p>
-            <a:r>
-              <a:rPr lang="en-US" sz="2400"/>
+            <a:endParaRPr lang="en-US" sz="4000" dirty="0"/>
+          </a:p>
+          <a:p>
+            <a:r>
+              <a:rPr lang="en-US" sz="4800"/>
               <a:t>Should </a:t>
             </a:r>
             <a:r>
-              <a:rPr lang="en-US" sz="2400" dirty="0"/>
+              <a:rPr lang="en-US" sz="4800" dirty="0"/>
               <a:t>be an option that you can turn on in many off-the-shelf implementations</a:t>
             </a:r>
           </a:p>
@@ -8654,14 +8607,13 @@
               <a:t>Step-By-Step Instructions for </a:t>
             </a:r>
             <a:r>
-              <a:rPr lang="en-US" dirty="0" err="1" smtClean="0"/>
+              <a:rPr lang="en-US" dirty="0" err="1"/>
               <a:t>Miniproject</a:t>
             </a:r>
             <a:r>
-              <a:rPr lang="en-US" dirty="0" smtClean="0"/>
+              <a:rPr lang="en-US" dirty="0"/>
               <a:t> 2</a:t>
             </a:r>
-            <a:endParaRPr lang="en-US" dirty="0"/>
           </a:p>
         </p:txBody>
       </p:sp>
@@ -8703,14 +8655,14 @@
           </p:nvPr>
         </p:nvGraphicFramePr>
         <p:xfrm>
-          <a:off x="1299412" y="2090562"/>
-          <a:ext cx="7085143" cy="774876"/>
+          <a:off x="2598826" y="6467125"/>
+          <a:ext cx="14170286" cy="1549751"/>
         </p:xfrm>
         <a:graphic>
           <a:graphicData uri="http://schemas.openxmlformats.org/presentationml/2006/ole">
             <mc:AlternateContent xmlns:mc="http://schemas.openxmlformats.org/markup-compatibility/2006">
               <mc:Choice xmlns:v="urn:schemas-microsoft-com:vml" Requires="v">
-                <p:oleObj spid="_x0000_s97296" name="Equation" r:id="rId3" imgW="4178300" imgH="457200" progId="Equation.3">
+                <p:oleObj spid="_x0000_s97301" name="Equation" r:id="rId3" imgW="4178300" imgH="457200" progId="Equation.3">
                   <p:embed/>
                 </p:oleObj>
               </mc:Choice>
@@ -8731,8 +8683,8 @@
                     </p:blipFill>
                     <p:spPr>
                       <a:xfrm>
-                        <a:off x="1299412" y="2090562"/>
-                        <a:ext cx="7085143" cy="774876"/>
+                        <a:off x="2598826" y="6467125"/>
+                        <a:ext cx="14170286" cy="1549751"/>
                       </a:xfrm>
                       <a:prstGeom prst="rect">
                         <a:avLst/>
@@ -8753,8 +8705,8 @@
         </p:nvSpPr>
         <p:spPr>
           <a:xfrm>
-            <a:off x="2270896" y="3042458"/>
-            <a:ext cx="2098276" cy="646331"/>
+            <a:off x="4541792" y="8370918"/>
+            <a:ext cx="5833392" cy="1643527"/>
           </a:xfrm>
           <a:prstGeom prst="rect">
             <a:avLst/>
@@ -8768,7 +8720,7 @@
           <a:lstStyle/>
           <a:p>
             <a:r>
-              <a:rPr lang="en-US" dirty="0">
+              <a:rPr lang="en-US" sz="5040" dirty="0">
                 <a:solidFill>
                   <a:srgbClr val="800000"/>
                 </a:solidFill>
@@ -8776,7 +8728,7 @@
               <a:t>S = set of indices (</a:t>
             </a:r>
             <a:r>
-              <a:rPr lang="en-US" dirty="0" err="1">
+              <a:rPr lang="en-US" sz="5040" dirty="0" err="1">
                 <a:solidFill>
                   <a:srgbClr val="800000"/>
                 </a:solidFill>
@@ -8784,7 +8736,7 @@
               <a:t>i,j</a:t>
             </a:r>
             <a:r>
-              <a:rPr lang="en-US" dirty="0">
+              <a:rPr lang="en-US" sz="5040" dirty="0">
                 <a:solidFill>
                   <a:srgbClr val="800000"/>
                 </a:solidFill>
@@ -8794,7 +8746,7 @@
           </a:p>
           <a:p>
             <a:r>
-              <a:rPr lang="en-US" dirty="0">
+              <a:rPr lang="en-US" sz="5040" dirty="0">
                 <a:solidFill>
                   <a:srgbClr val="800000"/>
                 </a:solidFill>
@@ -8814,8 +8766,8 @@
         </p:nvCxnSpPr>
         <p:spPr>
           <a:xfrm flipV="1">
-            <a:off x="4369172" y="2865438"/>
-            <a:ext cx="927096" cy="500186"/>
+            <a:off x="10375184" y="8016878"/>
+            <a:ext cx="217354" cy="1175804"/>
           </a:xfrm>
           <a:prstGeom prst="straightConnector1">
             <a:avLst/>
@@ -8854,8 +8806,8 @@
         </p:nvSpPr>
         <p:spPr>
           <a:xfrm>
-            <a:off x="457200" y="1563270"/>
-            <a:ext cx="4803456" cy="369332"/>
+            <a:off x="914401" y="5412541"/>
+            <a:ext cx="13100894" cy="867930"/>
           </a:xfrm>
           <a:prstGeom prst="rect">
             <a:avLst/>
@@ -8869,7 +8821,7 @@
           <a:lstStyle/>
           <a:p>
             <a:r>
-              <a:rPr lang="en-US" dirty="0">
+              <a:rPr lang="en-US" sz="5040" dirty="0">
                 <a:solidFill>
                   <a:srgbClr val="800000"/>
                 </a:solidFill>
@@ -8887,8 +8839,8 @@
         </p:nvCxnSpPr>
         <p:spPr>
           <a:xfrm flipH="1">
-            <a:off x="2270896" y="1899458"/>
-            <a:ext cx="158940" cy="191104"/>
+            <a:off x="4541791" y="6084916"/>
+            <a:ext cx="317880" cy="382209"/>
           </a:xfrm>
           <a:prstGeom prst="straightConnector1">
             <a:avLst/>
@@ -8927,8 +8879,8 @@
         </p:nvSpPr>
         <p:spPr>
           <a:xfrm>
-            <a:off x="5433062" y="3042458"/>
-            <a:ext cx="2694067" cy="646331"/>
+            <a:off x="10866124" y="8370918"/>
+            <a:ext cx="7199022" cy="1643527"/>
           </a:xfrm>
           <a:prstGeom prst="rect">
             <a:avLst/>
@@ -8942,7 +8894,7 @@
           <a:lstStyle/>
           <a:p>
             <a:r>
-              <a:rPr lang="en-US" dirty="0">
+              <a:rPr lang="en-US" sz="5040" dirty="0">
                 <a:solidFill>
                   <a:srgbClr val="800000"/>
                 </a:solidFill>
@@ -8952,7 +8904,7 @@
           </a:p>
           <a:p>
             <a:r>
-              <a:rPr lang="en-US" dirty="0">
+              <a:rPr lang="en-US" sz="5040" dirty="0">
                 <a:solidFill>
                   <a:srgbClr val="800000"/>
                 </a:solidFill>
@@ -8972,8 +8924,8 @@
         </p:nvCxnSpPr>
         <p:spPr>
           <a:xfrm flipV="1">
-            <a:off x="6780096" y="2583908"/>
-            <a:ext cx="651997" cy="458550"/>
+            <a:off x="14465635" y="7453817"/>
+            <a:ext cx="398554" cy="917101"/>
           </a:xfrm>
           <a:prstGeom prst="straightConnector1">
             <a:avLst/>
@@ -9014,8 +8966,8 @@
         </p:nvCxnSpPr>
         <p:spPr>
           <a:xfrm flipV="1">
-            <a:off x="6780096" y="2698466"/>
-            <a:ext cx="1099366" cy="343992"/>
+            <a:off x="14465635" y="7682935"/>
+            <a:ext cx="1293291" cy="687983"/>
           </a:xfrm>
           <a:prstGeom prst="straightConnector1">
             <a:avLst/>
@@ -9054,8 +9006,8 @@
         </p:nvSpPr>
         <p:spPr>
           <a:xfrm>
-            <a:off x="5296268" y="1760639"/>
-            <a:ext cx="3467616" cy="369332"/>
+            <a:off x="10592538" y="5807279"/>
+            <a:ext cx="9334415" cy="867930"/>
           </a:xfrm>
           <a:prstGeom prst="rect">
             <a:avLst/>
@@ -9069,7 +9021,7 @@
           <a:lstStyle/>
           <a:p>
             <a:r>
-              <a:rPr lang="en-US" dirty="0">
+              <a:rPr lang="en-US" sz="5040" dirty="0">
                 <a:solidFill>
                   <a:srgbClr val="800000"/>
                 </a:solidFill>
@@ -9143,8 +9095,8 @@
         </p:nvSpPr>
         <p:spPr>
           <a:xfrm>
-            <a:off x="457200" y="3413402"/>
-            <a:ext cx="8229600" cy="2818809"/>
+            <a:off x="914400" y="9112805"/>
+            <a:ext cx="16459200" cy="5637619"/>
           </a:xfrm>
         </p:spPr>
         <p:txBody>
@@ -9154,52 +9106,52 @@
           <a:lstStyle/>
           <a:p>
             <a:r>
-              <a:rPr lang="en-US" sz="2400" dirty="0"/>
+              <a:rPr lang="en-US" sz="4800" dirty="0"/>
               <a:t>Common K-dimensional representation over users &amp; movies</a:t>
             </a:r>
           </a:p>
           <a:p>
             <a:pPr lvl="1"/>
             <a:r>
-              <a:rPr lang="en-US" sz="2000" dirty="0"/>
+              <a:rPr lang="en-US" sz="4000" dirty="0"/>
               <a:t>Rating defined by dot product (aka un-normalized cosine similarity):</a:t>
             </a:r>
           </a:p>
           <a:p>
             <a:pPr lvl="1"/>
-            <a:endParaRPr lang="en-US" sz="2000" dirty="0"/>
+            <a:endParaRPr lang="en-US" sz="4000" dirty="0"/>
           </a:p>
           <a:p>
             <a:pPr lvl="1"/>
-            <a:endParaRPr lang="en-US" sz="2000" dirty="0"/>
-          </a:p>
-          <a:p>
-            <a:r>
-              <a:rPr lang="en-US" sz="2400" dirty="0"/>
+            <a:endParaRPr lang="en-US" sz="4000" dirty="0"/>
+          </a:p>
+          <a:p>
+            <a:r>
+              <a:rPr lang="en-US" sz="4800" dirty="0"/>
               <a:t>Does our representation make sense? </a:t>
             </a:r>
             <a:r>
-              <a:rPr lang="en-US" sz="2200" dirty="0"/>
+              <a:rPr lang="en-US" sz="4400" dirty="0"/>
               <a:t>(i.e., is it interpretable?)</a:t>
             </a:r>
           </a:p>
           <a:p>
             <a:pPr lvl="1"/>
             <a:r>
-              <a:rPr lang="en-US" sz="2000" dirty="0"/>
+              <a:rPr lang="en-US" sz="4000" dirty="0"/>
               <a:t>Need to visualize!</a:t>
             </a:r>
           </a:p>
           <a:p>
             <a:pPr lvl="1"/>
             <a:r>
-              <a:rPr lang="en-US" sz="2000" dirty="0"/>
+              <a:rPr lang="en-US" sz="4000" dirty="0"/>
               <a:t>But can only (easily) visualize 2-dim points, not K-dim points!</a:t>
             </a:r>
           </a:p>
           <a:p>
             <a:pPr lvl="1"/>
-            <a:endParaRPr lang="en-US" sz="2000" dirty="0"/>
+            <a:endParaRPr lang="en-US" sz="4000" dirty="0"/>
           </a:p>
         </p:txBody>
       </p:sp>
@@ -9223,14 +9175,13 @@
               <a:t>Step-By-Step Instructions for </a:t>
             </a:r>
             <a:r>
-              <a:rPr lang="en-US" dirty="0" err="1" smtClean="0"/>
+              <a:rPr lang="en-US" dirty="0" err="1"/>
               <a:t>Miniproject</a:t>
             </a:r>
             <a:r>
-              <a:rPr lang="en-US" dirty="0" smtClean="0"/>
+              <a:rPr lang="en-US" dirty="0"/>
               <a:t> 2</a:t>
             </a:r>
-            <a:endParaRPr lang="en-US" dirty="0"/>
           </a:p>
         </p:txBody>
       </p:sp>
@@ -9273,8 +9224,8 @@
         </p:blipFill>
         <p:spPr>
           <a:xfrm>
-            <a:off x="2054582" y="1295768"/>
-            <a:ext cx="5029380" cy="2117634"/>
+            <a:off x="4109164" y="4877536"/>
+            <a:ext cx="10058760" cy="4235269"/>
           </a:xfrm>
           <a:prstGeom prst="rect">
             <a:avLst/>
@@ -9296,14 +9247,14 @@
           </p:nvPr>
         </p:nvGraphicFramePr>
         <p:xfrm>
-          <a:off x="2110400" y="4287288"/>
-          <a:ext cx="1461783" cy="596085"/>
+          <a:off x="4220801" y="10860578"/>
+          <a:ext cx="2923566" cy="1192170"/>
         </p:xfrm>
         <a:graphic>
           <a:graphicData uri="http://schemas.openxmlformats.org/presentationml/2006/ole">
             <mc:AlternateContent xmlns:mc="http://schemas.openxmlformats.org/markup-compatibility/2006">
               <mc:Choice xmlns:v="urn:schemas-microsoft-com:vml" Requires="v">
-                <p:oleObj spid="_x0000_s92262" name="Equation" r:id="rId4" imgW="622300" imgH="254000" progId="Equation.3">
+                <p:oleObj spid="_x0000_s92272" name="Equation" r:id="rId4" imgW="622300" imgH="254000" progId="Equation.3">
                   <p:embed/>
                 </p:oleObj>
               </mc:Choice>
@@ -9324,8 +9275,8 @@
                     </p:blipFill>
                     <p:spPr>
                       <a:xfrm>
-                        <a:off x="2110400" y="4287288"/>
-                        <a:ext cx="1461783" cy="596085"/>
+                        <a:off x="4220801" y="10860578"/>
+                        <a:ext cx="2923566" cy="1192170"/>
                       </a:xfrm>
                       <a:prstGeom prst="rect">
                         <a:avLst/>
@@ -9353,14 +9304,14 @@
           </p:nvPr>
         </p:nvGraphicFramePr>
         <p:xfrm>
-          <a:off x="4694145" y="4286473"/>
-          <a:ext cx="2625725" cy="596900"/>
+          <a:off x="9388292" y="10858946"/>
+          <a:ext cx="5251450" cy="1193800"/>
         </p:xfrm>
         <a:graphic>
           <a:graphicData uri="http://schemas.openxmlformats.org/presentationml/2006/ole">
             <mc:AlternateContent xmlns:mc="http://schemas.openxmlformats.org/markup-compatibility/2006">
               <mc:Choice xmlns:v="urn:schemas-microsoft-com:vml" Requires="v">
-                <p:oleObj spid="_x0000_s92263" name="Equation" r:id="rId6" imgW="1117600" imgH="254000" progId="Equation.3">
+                <p:oleObj spid="_x0000_s92273" name="Equation" r:id="rId6" imgW="1117600" imgH="254000" progId="Equation.3">
                   <p:embed/>
                 </p:oleObj>
               </mc:Choice>
@@ -9381,8 +9332,8 @@
                     </p:blipFill>
                     <p:spPr>
                       <a:xfrm>
-                        <a:off x="4694145" y="4286473"/>
-                        <a:ext cx="2625725" cy="596900"/>
+                        <a:off x="9388292" y="10858946"/>
+                        <a:ext cx="5251450" cy="1193800"/>
                       </a:xfrm>
                       <a:prstGeom prst="rect">
                         <a:avLst/>
@@ -9403,8 +9354,8 @@
         </p:nvSpPr>
         <p:spPr>
           <a:xfrm>
-            <a:off x="3912696" y="4346013"/>
-            <a:ext cx="415498" cy="400110"/>
+            <a:off x="7825393" y="10978026"/>
+            <a:ext cx="635110" cy="707886"/>
           </a:xfrm>
           <a:prstGeom prst="rect">
             <a:avLst/>
@@ -9418,7 +9369,7 @@
           <a:lstStyle/>
           <a:p>
             <a:r>
-              <a:rPr lang="en-US" sz="2000" dirty="0"/>
+              <a:rPr lang="en-US" sz="4000" dirty="0"/>
               <a:t>or</a:t>
             </a:r>
           </a:p>

</xml_diff>